<commit_message>
Updated ppt + clean code
</commit_message>
<xml_diff>
--- a/docs/02 Final Project Presentation.pptx
+++ b/docs/02 Final Project Presentation.pptx
@@ -6,7 +6,7 @@
     <p:sldMasterId id="2147483677" r:id="rId2"/>
   </p:sldMasterIdLst>
   <p:notesMasterIdLst>
-    <p:notesMasterId r:id="rId10"/>
+    <p:notesMasterId r:id="rId11"/>
   </p:notesMasterIdLst>
   <p:sldIdLst>
     <p:sldId id="260" r:id="rId3"/>
@@ -16,6 +16,7 @@
     <p:sldId id="274" r:id="rId7"/>
     <p:sldId id="276" r:id="rId8"/>
     <p:sldId id="275" r:id="rId9"/>
+    <p:sldId id="262" r:id="rId10"/>
   </p:sldIdLst>
   <p:sldSz cx="12192000" cy="6858000"/>
   <p:notesSz cx="6858000" cy="9144000"/>
@@ -120,6 +121,2412 @@
     </p:ext>
   </p:extLst>
 </p:presentation>
+</file>
+
+<file path=ppt/diagrams/colors1.xml><?xml version="1.0" encoding="utf-8"?>
+<dgm:colorsDef xmlns:dgm="http://schemas.openxmlformats.org/drawingml/2006/diagram" xmlns:a="http://schemas.openxmlformats.org/drawingml/2006/main" uniqueId="urn:microsoft.com/office/officeart/2005/8/colors/colorful5">
+  <dgm:title val=""/>
+  <dgm:desc val=""/>
+  <dgm:catLst>
+    <dgm:cat type="colorful" pri="10500"/>
+  </dgm:catLst>
+  <dgm:styleLbl name="node0">
+    <dgm:fillClrLst meth="repeat">
+      <a:schemeClr val="accent4"/>
+    </dgm:fillClrLst>
+    <dgm:linClrLst meth="repeat">
+      <a:schemeClr val="lt1"/>
+    </dgm:linClrLst>
+    <dgm:effectClrLst/>
+    <dgm:txLinClrLst/>
+    <dgm:txFillClrLst/>
+    <dgm:txEffectClrLst/>
+  </dgm:styleLbl>
+  <dgm:styleLbl name="node1">
+    <dgm:fillClrLst>
+      <a:schemeClr val="accent5"/>
+      <a:schemeClr val="accent6"/>
+    </dgm:fillClrLst>
+    <dgm:linClrLst meth="repeat">
+      <a:schemeClr val="lt1"/>
+    </dgm:linClrLst>
+    <dgm:effectClrLst/>
+    <dgm:txLinClrLst/>
+    <dgm:txFillClrLst/>
+    <dgm:txEffectClrLst/>
+  </dgm:styleLbl>
+  <dgm:styleLbl name="alignNode1">
+    <dgm:fillClrLst>
+      <a:schemeClr val="accent5"/>
+      <a:schemeClr val="accent6"/>
+    </dgm:fillClrLst>
+    <dgm:linClrLst>
+      <a:schemeClr val="accent5"/>
+      <a:schemeClr val="accent6"/>
+    </dgm:linClrLst>
+    <dgm:effectClrLst/>
+    <dgm:txLinClrLst/>
+    <dgm:txFillClrLst/>
+    <dgm:txEffectClrLst/>
+  </dgm:styleLbl>
+  <dgm:styleLbl name="lnNode1">
+    <dgm:fillClrLst>
+      <a:schemeClr val="accent5"/>
+      <a:schemeClr val="accent6"/>
+    </dgm:fillClrLst>
+    <dgm:linClrLst meth="repeat">
+      <a:schemeClr val="lt1"/>
+    </dgm:linClrLst>
+    <dgm:effectClrLst/>
+    <dgm:txLinClrLst/>
+    <dgm:txFillClrLst/>
+    <dgm:txEffectClrLst/>
+  </dgm:styleLbl>
+  <dgm:styleLbl name="vennNode1">
+    <dgm:fillClrLst>
+      <a:schemeClr val="accent5">
+        <a:alpha val="50000"/>
+      </a:schemeClr>
+      <a:schemeClr val="accent6">
+        <a:alpha val="50000"/>
+      </a:schemeClr>
+    </dgm:fillClrLst>
+    <dgm:linClrLst meth="repeat">
+      <a:schemeClr val="lt1"/>
+    </dgm:linClrLst>
+    <dgm:effectClrLst/>
+    <dgm:txLinClrLst/>
+    <dgm:txFillClrLst/>
+    <dgm:txEffectClrLst/>
+  </dgm:styleLbl>
+  <dgm:styleLbl name="node2">
+    <dgm:fillClrLst>
+      <a:schemeClr val="accent6"/>
+    </dgm:fillClrLst>
+    <dgm:linClrLst meth="repeat">
+      <a:schemeClr val="lt1"/>
+    </dgm:linClrLst>
+    <dgm:effectClrLst/>
+    <dgm:txLinClrLst/>
+    <dgm:txFillClrLst/>
+    <dgm:txEffectClrLst/>
+  </dgm:styleLbl>
+  <dgm:styleLbl name="node3">
+    <dgm:fillClrLst>
+      <a:schemeClr val="accent1"/>
+    </dgm:fillClrLst>
+    <dgm:linClrLst meth="repeat">
+      <a:schemeClr val="lt1"/>
+    </dgm:linClrLst>
+    <dgm:effectClrLst/>
+    <dgm:txLinClrLst/>
+    <dgm:txFillClrLst/>
+    <dgm:txEffectClrLst/>
+  </dgm:styleLbl>
+  <dgm:styleLbl name="node4">
+    <dgm:fillClrLst>
+      <a:schemeClr val="accent2"/>
+    </dgm:fillClrLst>
+    <dgm:linClrLst meth="repeat">
+      <a:schemeClr val="lt1"/>
+    </dgm:linClrLst>
+    <dgm:effectClrLst/>
+    <dgm:txLinClrLst/>
+    <dgm:txFillClrLst/>
+    <dgm:txEffectClrLst/>
+  </dgm:styleLbl>
+  <dgm:styleLbl name="fgImgPlace1">
+    <dgm:fillClrLst>
+      <a:schemeClr val="accent5">
+        <a:tint val="50000"/>
+      </a:schemeClr>
+      <a:schemeClr val="accent6">
+        <a:tint val="50000"/>
+      </a:schemeClr>
+    </dgm:fillClrLst>
+    <dgm:linClrLst meth="repeat">
+      <a:schemeClr val="lt1"/>
+    </dgm:linClrLst>
+    <dgm:effectClrLst/>
+    <dgm:txLinClrLst/>
+    <dgm:txFillClrLst meth="repeat">
+      <a:schemeClr val="lt1"/>
+    </dgm:txFillClrLst>
+    <dgm:txEffectClrLst/>
+  </dgm:styleLbl>
+  <dgm:styleLbl name="alignImgPlace1">
+    <dgm:fillClrLst>
+      <a:schemeClr val="accent5">
+        <a:tint val="50000"/>
+      </a:schemeClr>
+      <a:schemeClr val="accent6">
+        <a:tint val="20000"/>
+      </a:schemeClr>
+    </dgm:fillClrLst>
+    <dgm:linClrLst meth="repeat">
+      <a:schemeClr val="lt1"/>
+    </dgm:linClrLst>
+    <dgm:effectClrLst/>
+    <dgm:txLinClrLst/>
+    <dgm:txFillClrLst meth="repeat">
+      <a:schemeClr val="lt1"/>
+    </dgm:txFillClrLst>
+    <dgm:txEffectClrLst/>
+  </dgm:styleLbl>
+  <dgm:styleLbl name="bgImgPlace1">
+    <dgm:fillClrLst>
+      <a:schemeClr val="accent5">
+        <a:tint val="50000"/>
+      </a:schemeClr>
+      <a:schemeClr val="accent6">
+        <a:tint val="20000"/>
+      </a:schemeClr>
+    </dgm:fillClrLst>
+    <dgm:linClrLst meth="repeat">
+      <a:schemeClr val="lt1"/>
+    </dgm:linClrLst>
+    <dgm:effectClrLst/>
+    <dgm:txLinClrLst/>
+    <dgm:txFillClrLst meth="repeat">
+      <a:schemeClr val="lt1"/>
+    </dgm:txFillClrLst>
+    <dgm:txEffectClrLst/>
+  </dgm:styleLbl>
+  <dgm:styleLbl name="sibTrans2D1">
+    <dgm:fillClrLst>
+      <a:schemeClr val="accent5"/>
+      <a:schemeClr val="accent6"/>
+    </dgm:fillClrLst>
+    <dgm:linClrLst meth="repeat">
+      <a:schemeClr val="lt1"/>
+    </dgm:linClrLst>
+    <dgm:effectClrLst/>
+    <dgm:txLinClrLst/>
+    <dgm:txFillClrLst/>
+    <dgm:txEffectClrLst/>
+  </dgm:styleLbl>
+  <dgm:styleLbl name="fgSibTrans2D1">
+    <dgm:fillClrLst>
+      <a:schemeClr val="accent5"/>
+      <a:schemeClr val="accent6"/>
+    </dgm:fillClrLst>
+    <dgm:linClrLst meth="repeat">
+      <a:schemeClr val="lt1"/>
+    </dgm:linClrLst>
+    <dgm:effectClrLst/>
+    <dgm:txLinClrLst/>
+    <dgm:txFillClrLst meth="repeat">
+      <a:schemeClr val="lt1"/>
+    </dgm:txFillClrLst>
+    <dgm:txEffectClrLst/>
+  </dgm:styleLbl>
+  <dgm:styleLbl name="bgSibTrans2D1">
+    <dgm:fillClrLst>
+      <a:schemeClr val="accent5"/>
+      <a:schemeClr val="accent6"/>
+    </dgm:fillClrLst>
+    <dgm:linClrLst meth="repeat">
+      <a:schemeClr val="lt1"/>
+    </dgm:linClrLst>
+    <dgm:effectClrLst/>
+    <dgm:txLinClrLst/>
+    <dgm:txFillClrLst meth="repeat">
+      <a:schemeClr val="lt1"/>
+    </dgm:txFillClrLst>
+    <dgm:txEffectClrLst/>
+  </dgm:styleLbl>
+  <dgm:styleLbl name="sibTrans1D1">
+    <dgm:fillClrLst/>
+    <dgm:linClrLst>
+      <a:schemeClr val="accent5"/>
+      <a:schemeClr val="accent6"/>
+    </dgm:linClrLst>
+    <dgm:effectClrLst/>
+    <dgm:txLinClrLst/>
+    <dgm:txFillClrLst meth="repeat">
+      <a:schemeClr val="tx1"/>
+    </dgm:txFillClrLst>
+    <dgm:txEffectClrLst/>
+  </dgm:styleLbl>
+  <dgm:styleLbl name="callout">
+    <dgm:fillClrLst meth="repeat">
+      <a:schemeClr val="accent5"/>
+    </dgm:fillClrLst>
+    <dgm:linClrLst meth="repeat">
+      <a:schemeClr val="accent5">
+        <a:tint val="50000"/>
+      </a:schemeClr>
+    </dgm:linClrLst>
+    <dgm:effectClrLst/>
+    <dgm:txLinClrLst/>
+    <dgm:txFillClrLst meth="repeat">
+      <a:schemeClr val="tx1"/>
+    </dgm:txFillClrLst>
+    <dgm:txEffectClrLst/>
+  </dgm:styleLbl>
+  <dgm:styleLbl name="asst0">
+    <dgm:fillClrLst meth="repeat">
+      <a:schemeClr val="accent5"/>
+    </dgm:fillClrLst>
+    <dgm:linClrLst meth="repeat">
+      <a:schemeClr val="lt1">
+        <a:shade val="80000"/>
+      </a:schemeClr>
+    </dgm:linClrLst>
+    <dgm:effectClrLst/>
+    <dgm:txLinClrLst/>
+    <dgm:txFillClrLst/>
+    <dgm:txEffectClrLst/>
+  </dgm:styleLbl>
+  <dgm:styleLbl name="asst1">
+    <dgm:fillClrLst meth="repeat">
+      <a:schemeClr val="accent6"/>
+    </dgm:fillClrLst>
+    <dgm:linClrLst meth="repeat">
+      <a:schemeClr val="lt1">
+        <a:shade val="80000"/>
+      </a:schemeClr>
+    </dgm:linClrLst>
+    <dgm:effectClrLst/>
+    <dgm:txLinClrLst/>
+    <dgm:txFillClrLst/>
+    <dgm:txEffectClrLst/>
+  </dgm:styleLbl>
+  <dgm:styleLbl name="asst2">
+    <dgm:fillClrLst>
+      <a:schemeClr val="accent1"/>
+    </dgm:fillClrLst>
+    <dgm:linClrLst meth="repeat">
+      <a:schemeClr val="lt1"/>
+    </dgm:linClrLst>
+    <dgm:effectClrLst/>
+    <dgm:txLinClrLst/>
+    <dgm:txFillClrLst/>
+    <dgm:txEffectClrLst/>
+  </dgm:styleLbl>
+  <dgm:styleLbl name="asst3">
+    <dgm:fillClrLst>
+      <a:schemeClr val="accent2"/>
+    </dgm:fillClrLst>
+    <dgm:linClrLst meth="repeat">
+      <a:schemeClr val="lt1"/>
+    </dgm:linClrLst>
+    <dgm:effectClrLst/>
+    <dgm:txLinClrLst/>
+    <dgm:txFillClrLst/>
+    <dgm:txEffectClrLst/>
+  </dgm:styleLbl>
+  <dgm:styleLbl name="asst4">
+    <dgm:fillClrLst>
+      <a:schemeClr val="accent3"/>
+    </dgm:fillClrLst>
+    <dgm:linClrLst meth="repeat">
+      <a:schemeClr val="lt1"/>
+    </dgm:linClrLst>
+    <dgm:effectClrLst/>
+    <dgm:txLinClrLst/>
+    <dgm:txFillClrLst/>
+    <dgm:txEffectClrLst/>
+  </dgm:styleLbl>
+  <dgm:styleLbl name="parChTrans2D1">
+    <dgm:fillClrLst meth="repeat">
+      <a:schemeClr val="accent5"/>
+    </dgm:fillClrLst>
+    <dgm:linClrLst meth="repeat">
+      <a:schemeClr val="lt1"/>
+    </dgm:linClrLst>
+    <dgm:effectClrLst/>
+    <dgm:txLinClrLst/>
+    <dgm:txFillClrLst meth="repeat">
+      <a:schemeClr val="lt1"/>
+    </dgm:txFillClrLst>
+    <dgm:txEffectClrLst/>
+  </dgm:styleLbl>
+  <dgm:styleLbl name="parChTrans2D2">
+    <dgm:fillClrLst meth="repeat">
+      <a:schemeClr val="accent6"/>
+    </dgm:fillClrLst>
+    <dgm:linClrLst meth="repeat">
+      <a:schemeClr val="lt1"/>
+    </dgm:linClrLst>
+    <dgm:effectClrLst/>
+    <dgm:txLinClrLst/>
+    <dgm:txFillClrLst/>
+    <dgm:txEffectClrLst/>
+  </dgm:styleLbl>
+  <dgm:styleLbl name="parChTrans2D3">
+    <dgm:fillClrLst meth="repeat">
+      <a:schemeClr val="accent6"/>
+    </dgm:fillClrLst>
+    <dgm:linClrLst meth="repeat">
+      <a:schemeClr val="lt1"/>
+    </dgm:linClrLst>
+    <dgm:effectClrLst/>
+    <dgm:txLinClrLst/>
+    <dgm:txFillClrLst/>
+    <dgm:txEffectClrLst/>
+  </dgm:styleLbl>
+  <dgm:styleLbl name="parChTrans2D4">
+    <dgm:fillClrLst meth="repeat">
+      <a:schemeClr val="accent1"/>
+    </dgm:fillClrLst>
+    <dgm:linClrLst meth="repeat">
+      <a:schemeClr val="lt1"/>
+    </dgm:linClrLst>
+    <dgm:effectClrLst/>
+    <dgm:txLinClrLst/>
+    <dgm:txFillClrLst meth="repeat">
+      <a:schemeClr val="lt1"/>
+    </dgm:txFillClrLst>
+    <dgm:txEffectClrLst/>
+  </dgm:styleLbl>
+  <dgm:styleLbl name="parChTrans1D1">
+    <dgm:fillClrLst meth="repeat">
+      <a:schemeClr val="accent5"/>
+    </dgm:fillClrLst>
+    <dgm:linClrLst meth="repeat">
+      <a:schemeClr val="accent5"/>
+    </dgm:linClrLst>
+    <dgm:effectClrLst/>
+    <dgm:txLinClrLst/>
+    <dgm:txFillClrLst meth="repeat">
+      <a:schemeClr val="tx1"/>
+    </dgm:txFillClrLst>
+    <dgm:txEffectClrLst/>
+  </dgm:styleLbl>
+  <dgm:styleLbl name="parChTrans1D2">
+    <dgm:fillClrLst meth="repeat">
+      <a:schemeClr val="accent6">
+        <a:tint val="90000"/>
+      </a:schemeClr>
+    </dgm:fillClrLst>
+    <dgm:linClrLst meth="repeat">
+      <a:schemeClr val="accent6"/>
+    </dgm:linClrLst>
+    <dgm:effectClrLst/>
+    <dgm:txLinClrLst/>
+    <dgm:txFillClrLst meth="repeat">
+      <a:schemeClr val="tx1"/>
+    </dgm:txFillClrLst>
+    <dgm:txEffectClrLst/>
+  </dgm:styleLbl>
+  <dgm:styleLbl name="parChTrans1D3">
+    <dgm:fillClrLst meth="repeat">
+      <a:schemeClr val="accent6">
+        <a:tint val="70000"/>
+      </a:schemeClr>
+    </dgm:fillClrLst>
+    <dgm:linClrLst meth="repeat">
+      <a:schemeClr val="accent1"/>
+    </dgm:linClrLst>
+    <dgm:effectClrLst/>
+    <dgm:txLinClrLst/>
+    <dgm:txFillClrLst meth="repeat">
+      <a:schemeClr val="tx1"/>
+    </dgm:txFillClrLst>
+    <dgm:txEffectClrLst/>
+  </dgm:styleLbl>
+  <dgm:styleLbl name="parChTrans1D4">
+    <dgm:fillClrLst meth="repeat">
+      <a:schemeClr val="accent6">
+        <a:tint val="50000"/>
+      </a:schemeClr>
+    </dgm:fillClrLst>
+    <dgm:linClrLst meth="repeat">
+      <a:schemeClr val="accent2"/>
+    </dgm:linClrLst>
+    <dgm:effectClrLst/>
+    <dgm:txLinClrLst/>
+    <dgm:txFillClrLst meth="repeat">
+      <a:schemeClr val="tx1"/>
+    </dgm:txFillClrLst>
+    <dgm:txEffectClrLst/>
+  </dgm:styleLbl>
+  <dgm:styleLbl name="fgAcc1">
+    <dgm:fillClrLst meth="repeat">
+      <a:schemeClr val="lt1">
+        <a:alpha val="90000"/>
+      </a:schemeClr>
+    </dgm:fillClrLst>
+    <dgm:linClrLst>
+      <a:schemeClr val="accent5"/>
+      <a:schemeClr val="accent6"/>
+    </dgm:linClrLst>
+    <dgm:effectClrLst/>
+    <dgm:txLinClrLst/>
+    <dgm:txFillClrLst meth="repeat">
+      <a:schemeClr val="dk1"/>
+    </dgm:txFillClrLst>
+    <dgm:txEffectClrLst/>
+  </dgm:styleLbl>
+  <dgm:styleLbl name="conFgAcc1">
+    <dgm:fillClrLst meth="repeat">
+      <a:schemeClr val="lt1">
+        <a:alpha val="90000"/>
+      </a:schemeClr>
+    </dgm:fillClrLst>
+    <dgm:linClrLst>
+      <a:schemeClr val="accent5"/>
+      <a:schemeClr val="accent6"/>
+    </dgm:linClrLst>
+    <dgm:effectClrLst/>
+    <dgm:txLinClrLst/>
+    <dgm:txFillClrLst meth="repeat">
+      <a:schemeClr val="dk1"/>
+    </dgm:txFillClrLst>
+    <dgm:txEffectClrLst/>
+  </dgm:styleLbl>
+  <dgm:styleLbl name="alignAcc1">
+    <dgm:fillClrLst meth="repeat">
+      <a:schemeClr val="lt1">
+        <a:alpha val="90000"/>
+      </a:schemeClr>
+    </dgm:fillClrLst>
+    <dgm:linClrLst>
+      <a:schemeClr val="accent5"/>
+      <a:schemeClr val="accent6"/>
+    </dgm:linClrLst>
+    <dgm:effectClrLst/>
+    <dgm:txLinClrLst/>
+    <dgm:txFillClrLst meth="repeat">
+      <a:schemeClr val="dk1"/>
+    </dgm:txFillClrLst>
+    <dgm:txEffectClrLst/>
+  </dgm:styleLbl>
+  <dgm:styleLbl name="trAlignAcc1">
+    <dgm:fillClrLst meth="repeat">
+      <a:schemeClr val="lt1">
+        <a:alpha val="40000"/>
+      </a:schemeClr>
+    </dgm:fillClrLst>
+    <dgm:linClrLst meth="repeat">
+      <a:schemeClr val="accent5"/>
+    </dgm:linClrLst>
+    <dgm:effectClrLst/>
+    <dgm:txLinClrLst/>
+    <dgm:txFillClrLst meth="repeat">
+      <a:schemeClr val="dk1"/>
+    </dgm:txFillClrLst>
+    <dgm:txEffectClrLst/>
+  </dgm:styleLbl>
+  <dgm:styleLbl name="bgAcc1">
+    <dgm:fillClrLst meth="repeat">
+      <a:schemeClr val="lt1">
+        <a:alpha val="90000"/>
+      </a:schemeClr>
+    </dgm:fillClrLst>
+    <dgm:linClrLst>
+      <a:schemeClr val="accent5"/>
+      <a:schemeClr val="accent6"/>
+    </dgm:linClrLst>
+    <dgm:effectClrLst/>
+    <dgm:txLinClrLst/>
+    <dgm:txFillClrLst meth="repeat">
+      <a:schemeClr val="dk1"/>
+    </dgm:txFillClrLst>
+    <dgm:txEffectClrLst/>
+  </dgm:styleLbl>
+  <dgm:styleLbl name="solidFgAcc1">
+    <dgm:fillClrLst meth="repeat">
+      <a:schemeClr val="lt1"/>
+    </dgm:fillClrLst>
+    <dgm:linClrLst>
+      <a:schemeClr val="accent5"/>
+      <a:schemeClr val="accent6"/>
+    </dgm:linClrLst>
+    <dgm:effectClrLst/>
+    <dgm:txLinClrLst/>
+    <dgm:txFillClrLst meth="repeat">
+      <a:schemeClr val="dk1"/>
+    </dgm:txFillClrLst>
+    <dgm:txEffectClrLst/>
+  </dgm:styleLbl>
+  <dgm:styleLbl name="solidAlignAcc1">
+    <dgm:fillClrLst meth="repeat">
+      <a:schemeClr val="lt1"/>
+    </dgm:fillClrLst>
+    <dgm:linClrLst>
+      <a:schemeClr val="accent5"/>
+      <a:schemeClr val="accent6"/>
+    </dgm:linClrLst>
+    <dgm:effectClrLst/>
+    <dgm:txLinClrLst/>
+    <dgm:txFillClrLst meth="repeat">
+      <a:schemeClr val="dk1"/>
+    </dgm:txFillClrLst>
+    <dgm:txEffectClrLst/>
+  </dgm:styleLbl>
+  <dgm:styleLbl name="solidBgAcc1">
+    <dgm:fillClrLst meth="repeat">
+      <a:schemeClr val="lt1"/>
+    </dgm:fillClrLst>
+    <dgm:linClrLst>
+      <a:schemeClr val="accent5"/>
+      <a:schemeClr val="accent6"/>
+    </dgm:linClrLst>
+    <dgm:effectClrLst/>
+    <dgm:txLinClrLst/>
+    <dgm:txFillClrLst meth="repeat">
+      <a:schemeClr val="dk1"/>
+    </dgm:txFillClrLst>
+    <dgm:txEffectClrLst/>
+  </dgm:styleLbl>
+  <dgm:styleLbl name="fgAccFollowNode1">
+    <dgm:fillClrLst>
+      <a:schemeClr val="accent5">
+        <a:tint val="40000"/>
+        <a:alpha val="90000"/>
+      </a:schemeClr>
+      <a:schemeClr val="accent6">
+        <a:tint val="40000"/>
+        <a:alpha val="90000"/>
+      </a:schemeClr>
+    </dgm:fillClrLst>
+    <dgm:linClrLst>
+      <a:schemeClr val="accent5">
+        <a:tint val="40000"/>
+        <a:alpha val="90000"/>
+      </a:schemeClr>
+      <a:schemeClr val="accent5">
+        <a:tint val="40000"/>
+        <a:alpha val="90000"/>
+      </a:schemeClr>
+    </dgm:linClrLst>
+    <dgm:effectClrLst/>
+    <dgm:txLinClrLst/>
+    <dgm:txFillClrLst meth="repeat">
+      <a:schemeClr val="dk1"/>
+    </dgm:txFillClrLst>
+    <dgm:txEffectClrLst/>
+  </dgm:styleLbl>
+  <dgm:styleLbl name="alignAccFollowNode1">
+    <dgm:fillClrLst>
+      <a:schemeClr val="accent5">
+        <a:tint val="40000"/>
+        <a:alpha val="90000"/>
+      </a:schemeClr>
+      <a:schemeClr val="accent6">
+        <a:tint val="40000"/>
+        <a:alpha val="90000"/>
+      </a:schemeClr>
+    </dgm:fillClrLst>
+    <dgm:linClrLst>
+      <a:schemeClr val="accent5">
+        <a:tint val="40000"/>
+        <a:alpha val="90000"/>
+      </a:schemeClr>
+      <a:schemeClr val="accent6">
+        <a:tint val="40000"/>
+        <a:alpha val="90000"/>
+      </a:schemeClr>
+    </dgm:linClrLst>
+    <dgm:effectClrLst/>
+    <dgm:txLinClrLst/>
+    <dgm:txFillClrLst meth="repeat">
+      <a:schemeClr val="dk1"/>
+    </dgm:txFillClrLst>
+    <dgm:txEffectClrLst/>
+  </dgm:styleLbl>
+  <dgm:styleLbl name="bgAccFollowNode1">
+    <dgm:fillClrLst>
+      <a:schemeClr val="accent5">
+        <a:tint val="40000"/>
+        <a:alpha val="90000"/>
+      </a:schemeClr>
+      <a:schemeClr val="accent6">
+        <a:tint val="40000"/>
+        <a:alpha val="90000"/>
+      </a:schemeClr>
+    </dgm:fillClrLst>
+    <dgm:linClrLst>
+      <a:schemeClr val="accent5">
+        <a:tint val="40000"/>
+        <a:alpha val="90000"/>
+      </a:schemeClr>
+      <a:schemeClr val="accent6">
+        <a:tint val="40000"/>
+        <a:alpha val="90000"/>
+      </a:schemeClr>
+    </dgm:linClrLst>
+    <dgm:effectClrLst/>
+    <dgm:txLinClrLst/>
+    <dgm:txFillClrLst meth="repeat">
+      <a:schemeClr val="dk1"/>
+    </dgm:txFillClrLst>
+    <dgm:txEffectClrLst/>
+  </dgm:styleLbl>
+  <dgm:styleLbl name="fgAcc0">
+    <dgm:fillClrLst meth="repeat">
+      <a:schemeClr val="lt1">
+        <a:alpha val="90000"/>
+      </a:schemeClr>
+    </dgm:fillClrLst>
+    <dgm:linClrLst>
+      <a:schemeClr val="accent4"/>
+    </dgm:linClrLst>
+    <dgm:effectClrLst/>
+    <dgm:txLinClrLst/>
+    <dgm:txFillClrLst meth="repeat">
+      <a:schemeClr val="dk1"/>
+    </dgm:txFillClrLst>
+    <dgm:txEffectClrLst/>
+  </dgm:styleLbl>
+  <dgm:styleLbl name="fgAcc2">
+    <dgm:fillClrLst meth="repeat">
+      <a:schemeClr val="lt1">
+        <a:alpha val="90000"/>
+      </a:schemeClr>
+    </dgm:fillClrLst>
+    <dgm:linClrLst>
+      <a:schemeClr val="accent6"/>
+    </dgm:linClrLst>
+    <dgm:effectClrLst/>
+    <dgm:txLinClrLst/>
+    <dgm:txFillClrLst meth="repeat">
+      <a:schemeClr val="dk1"/>
+    </dgm:txFillClrLst>
+    <dgm:txEffectClrLst/>
+  </dgm:styleLbl>
+  <dgm:styleLbl name="fgAcc3">
+    <dgm:fillClrLst meth="repeat">
+      <a:schemeClr val="lt1">
+        <a:alpha val="90000"/>
+      </a:schemeClr>
+    </dgm:fillClrLst>
+    <dgm:linClrLst>
+      <a:schemeClr val="accent1"/>
+    </dgm:linClrLst>
+    <dgm:effectClrLst/>
+    <dgm:txLinClrLst/>
+    <dgm:txFillClrLst meth="repeat">
+      <a:schemeClr val="dk1"/>
+    </dgm:txFillClrLst>
+    <dgm:txEffectClrLst/>
+  </dgm:styleLbl>
+  <dgm:styleLbl name="fgAcc4">
+    <dgm:fillClrLst meth="repeat">
+      <a:schemeClr val="lt1">
+        <a:alpha val="90000"/>
+      </a:schemeClr>
+    </dgm:fillClrLst>
+    <dgm:linClrLst>
+      <a:schemeClr val="accent2"/>
+    </dgm:linClrLst>
+    <dgm:effectClrLst/>
+    <dgm:txLinClrLst/>
+    <dgm:txFillClrLst meth="repeat">
+      <a:schemeClr val="dk1"/>
+    </dgm:txFillClrLst>
+    <dgm:txEffectClrLst/>
+  </dgm:styleLbl>
+  <dgm:styleLbl name="bgShp">
+    <dgm:fillClrLst meth="repeat">
+      <a:schemeClr val="accent5">
+        <a:tint val="40000"/>
+      </a:schemeClr>
+    </dgm:fillClrLst>
+    <dgm:linClrLst meth="repeat">
+      <a:schemeClr val="dk1"/>
+    </dgm:linClrLst>
+    <dgm:effectClrLst/>
+    <dgm:txLinClrLst/>
+    <dgm:txFillClrLst meth="repeat">
+      <a:schemeClr val="dk1"/>
+    </dgm:txFillClrLst>
+    <dgm:txEffectClrLst/>
+  </dgm:styleLbl>
+  <dgm:styleLbl name="dkBgShp">
+    <dgm:fillClrLst meth="repeat">
+      <a:schemeClr val="accent5">
+        <a:shade val="90000"/>
+      </a:schemeClr>
+    </dgm:fillClrLst>
+    <dgm:linClrLst meth="repeat">
+      <a:schemeClr val="dk1"/>
+    </dgm:linClrLst>
+    <dgm:effectClrLst/>
+    <dgm:txLinClrLst/>
+    <dgm:txFillClrLst meth="repeat">
+      <a:schemeClr val="lt1"/>
+    </dgm:txFillClrLst>
+    <dgm:txEffectClrLst/>
+  </dgm:styleLbl>
+  <dgm:styleLbl name="trBgShp">
+    <dgm:fillClrLst meth="repeat">
+      <a:schemeClr val="accent5">
+        <a:tint val="50000"/>
+        <a:alpha val="40000"/>
+      </a:schemeClr>
+    </dgm:fillClrLst>
+    <dgm:linClrLst meth="repeat">
+      <a:schemeClr val="accent5"/>
+    </dgm:linClrLst>
+    <dgm:effectClrLst/>
+    <dgm:txLinClrLst/>
+    <dgm:txFillClrLst meth="repeat">
+      <a:schemeClr val="lt1"/>
+    </dgm:txFillClrLst>
+    <dgm:txEffectClrLst/>
+  </dgm:styleLbl>
+  <dgm:styleLbl name="fgShp">
+    <dgm:fillClrLst meth="repeat">
+      <a:schemeClr val="accent5">
+        <a:tint val="40000"/>
+      </a:schemeClr>
+    </dgm:fillClrLst>
+    <dgm:linClrLst meth="repeat">
+      <a:schemeClr val="lt1"/>
+    </dgm:linClrLst>
+    <dgm:effectClrLst/>
+    <dgm:txLinClrLst/>
+    <dgm:txFillClrLst meth="repeat">
+      <a:schemeClr val="dk1"/>
+    </dgm:txFillClrLst>
+    <dgm:txEffectClrLst/>
+  </dgm:styleLbl>
+  <dgm:styleLbl name="revTx">
+    <dgm:fillClrLst meth="repeat">
+      <a:schemeClr val="lt1">
+        <a:alpha val="0"/>
+      </a:schemeClr>
+    </dgm:fillClrLst>
+    <dgm:linClrLst meth="repeat">
+      <a:schemeClr val="dk1">
+        <a:alpha val="0"/>
+      </a:schemeClr>
+    </dgm:linClrLst>
+    <dgm:effectClrLst/>
+    <dgm:txLinClrLst/>
+    <dgm:txFillClrLst meth="repeat">
+      <a:schemeClr val="tx1"/>
+    </dgm:txFillClrLst>
+    <dgm:txEffectClrLst/>
+  </dgm:styleLbl>
+</dgm:colorsDef>
+</file>
+
+<file path=ppt/diagrams/data1.xml><?xml version="1.0" encoding="utf-8"?>
+<dgm:dataModel xmlns:dgm="http://schemas.openxmlformats.org/drawingml/2006/diagram" xmlns:a="http://schemas.openxmlformats.org/drawingml/2006/main">
+  <dgm:ptLst>
+    <dgm:pt modelId="{33DDF14D-322E-43FC-ACF0-7457D10AB1AF}" type="doc">
+      <dgm:prSet loTypeId="urn:microsoft.com/office/officeart/2005/8/layout/default" loCatId="list" qsTypeId="urn:microsoft.com/office/officeart/2005/8/quickstyle/simple1" qsCatId="simple" csTypeId="urn:microsoft.com/office/officeart/2005/8/colors/colorful5" csCatId="colorful" phldr="1"/>
+      <dgm:spPr/>
+      <dgm:t>
+        <a:bodyPr/>
+        <a:lstStyle/>
+        <a:p>
+          <a:endParaRPr lang="es-MX"/>
+        </a:p>
+      </dgm:t>
+    </dgm:pt>
+    <dgm:pt modelId="{6122ED50-541B-412E-A874-9CCEFF83ADE1}">
+      <dgm:prSet phldrT="[Texto]"/>
+      <dgm:spPr/>
+      <dgm:t>
+        <a:bodyPr/>
+        <a:lstStyle/>
+        <a:p>
+          <a:r>
+            <a:rPr lang="es-MX" dirty="0"/>
+            <a:t>VGG16</a:t>
+          </a:r>
+        </a:p>
+      </dgm:t>
+    </dgm:pt>
+    <dgm:pt modelId="{26F50E60-6B10-4266-A63B-BF8DD6A1C967}" type="parTrans" cxnId="{1DBDB382-1134-4E11-830E-A62B5776C110}">
+      <dgm:prSet/>
+      <dgm:spPr/>
+      <dgm:t>
+        <a:bodyPr/>
+        <a:lstStyle/>
+        <a:p>
+          <a:endParaRPr lang="es-MX"/>
+        </a:p>
+      </dgm:t>
+    </dgm:pt>
+    <dgm:pt modelId="{0D4A9E57-570C-406E-B1DC-56C0B742D1F3}" type="sibTrans" cxnId="{1DBDB382-1134-4E11-830E-A62B5776C110}">
+      <dgm:prSet/>
+      <dgm:spPr/>
+      <dgm:t>
+        <a:bodyPr/>
+        <a:lstStyle/>
+        <a:p>
+          <a:endParaRPr lang="es-MX"/>
+        </a:p>
+      </dgm:t>
+    </dgm:pt>
+    <dgm:pt modelId="{0096CAE4-E6D6-4C84-A288-921E07C989CF}">
+      <dgm:prSet phldrT="[Texto]"/>
+      <dgm:spPr/>
+      <dgm:t>
+        <a:bodyPr/>
+        <a:lstStyle/>
+        <a:p>
+          <a:r>
+            <a:rPr lang="es-MX" dirty="0" err="1"/>
+            <a:t>Xception</a:t>
+          </a:r>
+          <a:endParaRPr lang="es-MX" dirty="0"/>
+        </a:p>
+      </dgm:t>
+    </dgm:pt>
+    <dgm:pt modelId="{5620B53F-EFD6-4A17-B7DF-830721C402CD}" type="parTrans" cxnId="{31A0DFF7-E75E-4C80-B3DE-E619A2072AB2}">
+      <dgm:prSet/>
+      <dgm:spPr/>
+      <dgm:t>
+        <a:bodyPr/>
+        <a:lstStyle/>
+        <a:p>
+          <a:endParaRPr lang="es-MX"/>
+        </a:p>
+      </dgm:t>
+    </dgm:pt>
+    <dgm:pt modelId="{F6A6529D-F982-4D7D-B291-F05B5E49565A}" type="sibTrans" cxnId="{31A0DFF7-E75E-4C80-B3DE-E619A2072AB2}">
+      <dgm:prSet/>
+      <dgm:spPr/>
+      <dgm:t>
+        <a:bodyPr/>
+        <a:lstStyle/>
+        <a:p>
+          <a:endParaRPr lang="es-MX"/>
+        </a:p>
+      </dgm:t>
+    </dgm:pt>
+    <dgm:pt modelId="{003FED11-ACC1-498D-8DB8-A2AE47EE3ECF}">
+      <dgm:prSet phldrT="[Texto]"/>
+      <dgm:spPr/>
+      <dgm:t>
+        <a:bodyPr/>
+        <a:lstStyle/>
+        <a:p>
+          <a:r>
+            <a:rPr lang="es-MX" dirty="0"/>
+            <a:t>Modelo de </a:t>
+          </a:r>
+          <a:r>
+            <a:rPr lang="es-MX" dirty="0" err="1"/>
+            <a:t>Keras</a:t>
+          </a:r>
+          <a:endParaRPr lang="es-MX" dirty="0"/>
+        </a:p>
+      </dgm:t>
+    </dgm:pt>
+    <dgm:pt modelId="{C0E71D3A-D0F2-44F8-81AB-C4F125A71133}" type="parTrans" cxnId="{4E689A82-5C36-4414-B1AD-853B16E13DE0}">
+      <dgm:prSet/>
+      <dgm:spPr/>
+      <dgm:t>
+        <a:bodyPr/>
+        <a:lstStyle/>
+        <a:p>
+          <a:endParaRPr lang="es-MX"/>
+        </a:p>
+      </dgm:t>
+    </dgm:pt>
+    <dgm:pt modelId="{283A9F48-6547-474E-898D-E51FF4378397}" type="sibTrans" cxnId="{4E689A82-5C36-4414-B1AD-853B16E13DE0}">
+      <dgm:prSet/>
+      <dgm:spPr/>
+      <dgm:t>
+        <a:bodyPr/>
+        <a:lstStyle/>
+        <a:p>
+          <a:endParaRPr lang="es-MX"/>
+        </a:p>
+      </dgm:t>
+    </dgm:pt>
+    <dgm:pt modelId="{DFB31426-F5C1-44F4-ABF4-D64D79FDFF8C}" type="pres">
+      <dgm:prSet presAssocID="{33DDF14D-322E-43FC-ACF0-7457D10AB1AF}" presName="diagram" presStyleCnt="0">
+        <dgm:presLayoutVars>
+          <dgm:dir/>
+          <dgm:resizeHandles val="exact"/>
+        </dgm:presLayoutVars>
+      </dgm:prSet>
+      <dgm:spPr/>
+    </dgm:pt>
+    <dgm:pt modelId="{6DDB933C-B7B2-4EA1-B022-D25A52DC2FD6}" type="pres">
+      <dgm:prSet presAssocID="{6122ED50-541B-412E-A874-9CCEFF83ADE1}" presName="node" presStyleLbl="node1" presStyleIdx="0" presStyleCnt="3">
+        <dgm:presLayoutVars>
+          <dgm:bulletEnabled val="1"/>
+        </dgm:presLayoutVars>
+      </dgm:prSet>
+      <dgm:spPr/>
+    </dgm:pt>
+    <dgm:pt modelId="{B585F504-C21B-4574-9713-8DE35F6E6F40}" type="pres">
+      <dgm:prSet presAssocID="{0D4A9E57-570C-406E-B1DC-56C0B742D1F3}" presName="sibTrans" presStyleCnt="0"/>
+      <dgm:spPr/>
+    </dgm:pt>
+    <dgm:pt modelId="{BC8DF0D2-316E-45B1-9062-2804E744DF34}" type="pres">
+      <dgm:prSet presAssocID="{0096CAE4-E6D6-4C84-A288-921E07C989CF}" presName="node" presStyleLbl="node1" presStyleIdx="1" presStyleCnt="3">
+        <dgm:presLayoutVars>
+          <dgm:bulletEnabled val="1"/>
+        </dgm:presLayoutVars>
+      </dgm:prSet>
+      <dgm:spPr/>
+    </dgm:pt>
+    <dgm:pt modelId="{920C3FA3-F8B3-4A97-8654-EE97FD8F6C53}" type="pres">
+      <dgm:prSet presAssocID="{F6A6529D-F982-4D7D-B291-F05B5E49565A}" presName="sibTrans" presStyleCnt="0"/>
+      <dgm:spPr/>
+    </dgm:pt>
+    <dgm:pt modelId="{DF41F5AC-A409-428E-B6B2-BA4CACAF3B66}" type="pres">
+      <dgm:prSet presAssocID="{003FED11-ACC1-498D-8DB8-A2AE47EE3ECF}" presName="node" presStyleLbl="node1" presStyleIdx="2" presStyleCnt="3">
+        <dgm:presLayoutVars>
+          <dgm:bulletEnabled val="1"/>
+        </dgm:presLayoutVars>
+      </dgm:prSet>
+      <dgm:spPr/>
+    </dgm:pt>
+  </dgm:ptLst>
+  <dgm:cxnLst>
+    <dgm:cxn modelId="{84523E1D-F688-4FEA-A909-67A41F25D3E3}" type="presOf" srcId="{0096CAE4-E6D6-4C84-A288-921E07C989CF}" destId="{BC8DF0D2-316E-45B1-9062-2804E744DF34}" srcOrd="0" destOrd="0" presId="urn:microsoft.com/office/officeart/2005/8/layout/default"/>
+    <dgm:cxn modelId="{E775927B-C685-41AD-AC7F-0A0F062B3DF5}" type="presOf" srcId="{33DDF14D-322E-43FC-ACF0-7457D10AB1AF}" destId="{DFB31426-F5C1-44F4-ABF4-D64D79FDFF8C}" srcOrd="0" destOrd="0" presId="urn:microsoft.com/office/officeart/2005/8/layout/default"/>
+    <dgm:cxn modelId="{4E689A82-5C36-4414-B1AD-853B16E13DE0}" srcId="{33DDF14D-322E-43FC-ACF0-7457D10AB1AF}" destId="{003FED11-ACC1-498D-8DB8-A2AE47EE3ECF}" srcOrd="2" destOrd="0" parTransId="{C0E71D3A-D0F2-44F8-81AB-C4F125A71133}" sibTransId="{283A9F48-6547-474E-898D-E51FF4378397}"/>
+    <dgm:cxn modelId="{1DBDB382-1134-4E11-830E-A62B5776C110}" srcId="{33DDF14D-322E-43FC-ACF0-7457D10AB1AF}" destId="{6122ED50-541B-412E-A874-9CCEFF83ADE1}" srcOrd="0" destOrd="0" parTransId="{26F50E60-6B10-4266-A63B-BF8DD6A1C967}" sibTransId="{0D4A9E57-570C-406E-B1DC-56C0B742D1F3}"/>
+    <dgm:cxn modelId="{270B33CE-73E7-4665-9521-5AA5E7DB8FF7}" type="presOf" srcId="{6122ED50-541B-412E-A874-9CCEFF83ADE1}" destId="{6DDB933C-B7B2-4EA1-B022-D25A52DC2FD6}" srcOrd="0" destOrd="0" presId="urn:microsoft.com/office/officeart/2005/8/layout/default"/>
+    <dgm:cxn modelId="{4004E6DD-B7C4-4914-9422-91C239576721}" type="presOf" srcId="{003FED11-ACC1-498D-8DB8-A2AE47EE3ECF}" destId="{DF41F5AC-A409-428E-B6B2-BA4CACAF3B66}" srcOrd="0" destOrd="0" presId="urn:microsoft.com/office/officeart/2005/8/layout/default"/>
+    <dgm:cxn modelId="{31A0DFF7-E75E-4C80-B3DE-E619A2072AB2}" srcId="{33DDF14D-322E-43FC-ACF0-7457D10AB1AF}" destId="{0096CAE4-E6D6-4C84-A288-921E07C989CF}" srcOrd="1" destOrd="0" parTransId="{5620B53F-EFD6-4A17-B7DF-830721C402CD}" sibTransId="{F6A6529D-F982-4D7D-B291-F05B5E49565A}"/>
+    <dgm:cxn modelId="{6E347ADE-5071-43D5-A6C9-F6609C3491FA}" type="presParOf" srcId="{DFB31426-F5C1-44F4-ABF4-D64D79FDFF8C}" destId="{6DDB933C-B7B2-4EA1-B022-D25A52DC2FD6}" srcOrd="0" destOrd="0" presId="urn:microsoft.com/office/officeart/2005/8/layout/default"/>
+    <dgm:cxn modelId="{D6BD359A-69CB-4039-96D3-C442938DF0A0}" type="presParOf" srcId="{DFB31426-F5C1-44F4-ABF4-D64D79FDFF8C}" destId="{B585F504-C21B-4574-9713-8DE35F6E6F40}" srcOrd="1" destOrd="0" presId="urn:microsoft.com/office/officeart/2005/8/layout/default"/>
+    <dgm:cxn modelId="{96DA1110-4697-4AB4-843D-78D9614B0FCF}" type="presParOf" srcId="{DFB31426-F5C1-44F4-ABF4-D64D79FDFF8C}" destId="{BC8DF0D2-316E-45B1-9062-2804E744DF34}" srcOrd="2" destOrd="0" presId="urn:microsoft.com/office/officeart/2005/8/layout/default"/>
+    <dgm:cxn modelId="{9EA4C82F-6B03-4B5D-A974-9B195F15BBA3}" type="presParOf" srcId="{DFB31426-F5C1-44F4-ABF4-D64D79FDFF8C}" destId="{920C3FA3-F8B3-4A97-8654-EE97FD8F6C53}" srcOrd="3" destOrd="0" presId="urn:microsoft.com/office/officeart/2005/8/layout/default"/>
+    <dgm:cxn modelId="{0BD14703-5883-49D4-B340-4FCD3507DA11}" type="presParOf" srcId="{DFB31426-F5C1-44F4-ABF4-D64D79FDFF8C}" destId="{DF41F5AC-A409-428E-B6B2-BA4CACAF3B66}" srcOrd="4" destOrd="0" presId="urn:microsoft.com/office/officeart/2005/8/layout/default"/>
+  </dgm:cxnLst>
+  <dgm:bg/>
+  <dgm:whole/>
+  <dgm:extLst>
+    <a:ext uri="http://schemas.microsoft.com/office/drawing/2008/diagram">
+      <dsp:dataModelExt xmlns:dsp="http://schemas.microsoft.com/office/drawing/2008/diagram" relId="rId6" minVer="http://schemas.openxmlformats.org/drawingml/2006/diagram"/>
+    </a:ext>
+  </dgm:extLst>
+</dgm:dataModel>
+</file>
+
+<file path=ppt/diagrams/drawing1.xml><?xml version="1.0" encoding="utf-8"?>
+<dsp:drawing xmlns:dgm="http://schemas.openxmlformats.org/drawingml/2006/diagram" xmlns:dsp="http://schemas.microsoft.com/office/drawing/2008/diagram" xmlns:a="http://schemas.openxmlformats.org/drawingml/2006/main">
+  <dsp:spTree>
+    <dsp:nvGrpSpPr>
+      <dsp:cNvPr id="0" name=""/>
+      <dsp:cNvGrpSpPr/>
+    </dsp:nvGrpSpPr>
+    <dsp:grpSpPr/>
+    <dsp:sp modelId="{6DDB933C-B7B2-4EA1-B022-D25A52DC2FD6}">
+      <dsp:nvSpPr>
+        <dsp:cNvPr id="0" name=""/>
+        <dsp:cNvSpPr/>
+      </dsp:nvSpPr>
+      <dsp:spPr>
+        <a:xfrm>
+          <a:off x="81803" y="488"/>
+          <a:ext cx="1160774" cy="696464"/>
+        </a:xfrm>
+        <a:prstGeom prst="rect">
+          <a:avLst/>
+        </a:prstGeom>
+        <a:solidFill>
+          <a:schemeClr val="accent5">
+            <a:hueOff val="0"/>
+            <a:satOff val="0"/>
+            <a:lumOff val="0"/>
+            <a:alphaOff val="0"/>
+          </a:schemeClr>
+        </a:solidFill>
+        <a:ln w="22225" cap="rnd" cmpd="sng" algn="ctr">
+          <a:solidFill>
+            <a:schemeClr val="lt1">
+              <a:hueOff val="0"/>
+              <a:satOff val="0"/>
+              <a:lumOff val="0"/>
+              <a:alphaOff val="0"/>
+            </a:schemeClr>
+          </a:solidFill>
+          <a:prstDash val="solid"/>
+        </a:ln>
+        <a:effectLst/>
+      </dsp:spPr>
+      <dsp:style>
+        <a:lnRef idx="2">
+          <a:scrgbClr r="0" g="0" b="0"/>
+        </a:lnRef>
+        <a:fillRef idx="1">
+          <a:scrgbClr r="0" g="0" b="0"/>
+        </a:fillRef>
+        <a:effectRef idx="0">
+          <a:scrgbClr r="0" g="0" b="0"/>
+        </a:effectRef>
+        <a:fontRef idx="minor">
+          <a:schemeClr val="lt1"/>
+        </a:fontRef>
+      </dsp:style>
+      <dsp:txBody>
+        <a:bodyPr spcFirstLastPara="0" vert="horz" wrap="square" lIns="76200" tIns="76200" rIns="76200" bIns="76200" numCol="1" spcCol="1270" anchor="ctr" anchorCtr="0">
+          <a:noAutofit/>
+        </a:bodyPr>
+        <a:lstStyle/>
+        <a:p>
+          <a:pPr marL="0" lvl="0" indent="0" algn="ctr" defTabSz="889000">
+            <a:lnSpc>
+              <a:spcPct val="90000"/>
+            </a:lnSpc>
+            <a:spcBef>
+              <a:spcPct val="0"/>
+            </a:spcBef>
+            <a:spcAft>
+              <a:spcPct val="35000"/>
+            </a:spcAft>
+            <a:buNone/>
+          </a:pPr>
+          <a:r>
+            <a:rPr lang="es-MX" sz="2000" kern="1200" dirty="0"/>
+            <a:t>VGG16</a:t>
+          </a:r>
+        </a:p>
+      </dsp:txBody>
+      <dsp:txXfrm>
+        <a:off x="81803" y="488"/>
+        <a:ext cx="1160774" cy="696464"/>
+      </dsp:txXfrm>
+    </dsp:sp>
+    <dsp:sp modelId="{BC8DF0D2-316E-45B1-9062-2804E744DF34}">
+      <dsp:nvSpPr>
+        <dsp:cNvPr id="0" name=""/>
+        <dsp:cNvSpPr/>
+      </dsp:nvSpPr>
+      <dsp:spPr>
+        <a:xfrm>
+          <a:off x="1358655" y="488"/>
+          <a:ext cx="1160774" cy="696464"/>
+        </a:xfrm>
+        <a:prstGeom prst="rect">
+          <a:avLst/>
+        </a:prstGeom>
+        <a:solidFill>
+          <a:schemeClr val="accent5">
+            <a:hueOff val="-335978"/>
+            <a:satOff val="-5192"/>
+            <a:lumOff val="-10589"/>
+            <a:alphaOff val="0"/>
+          </a:schemeClr>
+        </a:solidFill>
+        <a:ln w="22225" cap="rnd" cmpd="sng" algn="ctr">
+          <a:solidFill>
+            <a:schemeClr val="lt1">
+              <a:hueOff val="0"/>
+              <a:satOff val="0"/>
+              <a:lumOff val="0"/>
+              <a:alphaOff val="0"/>
+            </a:schemeClr>
+          </a:solidFill>
+          <a:prstDash val="solid"/>
+        </a:ln>
+        <a:effectLst/>
+      </dsp:spPr>
+      <dsp:style>
+        <a:lnRef idx="2">
+          <a:scrgbClr r="0" g="0" b="0"/>
+        </a:lnRef>
+        <a:fillRef idx="1">
+          <a:scrgbClr r="0" g="0" b="0"/>
+        </a:fillRef>
+        <a:effectRef idx="0">
+          <a:scrgbClr r="0" g="0" b="0"/>
+        </a:effectRef>
+        <a:fontRef idx="minor">
+          <a:schemeClr val="lt1"/>
+        </a:fontRef>
+      </dsp:style>
+      <dsp:txBody>
+        <a:bodyPr spcFirstLastPara="0" vert="horz" wrap="square" lIns="76200" tIns="76200" rIns="76200" bIns="76200" numCol="1" spcCol="1270" anchor="ctr" anchorCtr="0">
+          <a:noAutofit/>
+        </a:bodyPr>
+        <a:lstStyle/>
+        <a:p>
+          <a:pPr marL="0" lvl="0" indent="0" algn="ctr" defTabSz="889000">
+            <a:lnSpc>
+              <a:spcPct val="90000"/>
+            </a:lnSpc>
+            <a:spcBef>
+              <a:spcPct val="0"/>
+            </a:spcBef>
+            <a:spcAft>
+              <a:spcPct val="35000"/>
+            </a:spcAft>
+            <a:buNone/>
+          </a:pPr>
+          <a:r>
+            <a:rPr lang="es-MX" sz="2000" kern="1200" dirty="0" err="1"/>
+            <a:t>Xception</a:t>
+          </a:r>
+          <a:endParaRPr lang="es-MX" sz="2000" kern="1200" dirty="0"/>
+        </a:p>
+      </dsp:txBody>
+      <dsp:txXfrm>
+        <a:off x="1358655" y="488"/>
+        <a:ext cx="1160774" cy="696464"/>
+      </dsp:txXfrm>
+    </dsp:sp>
+    <dsp:sp modelId="{DF41F5AC-A409-428E-B6B2-BA4CACAF3B66}">
+      <dsp:nvSpPr>
+        <dsp:cNvPr id="0" name=""/>
+        <dsp:cNvSpPr/>
+      </dsp:nvSpPr>
+      <dsp:spPr>
+        <a:xfrm>
+          <a:off x="2635507" y="488"/>
+          <a:ext cx="1160774" cy="696464"/>
+        </a:xfrm>
+        <a:prstGeom prst="rect">
+          <a:avLst/>
+        </a:prstGeom>
+        <a:solidFill>
+          <a:schemeClr val="accent5">
+            <a:hueOff val="-671956"/>
+            <a:satOff val="-10384"/>
+            <a:lumOff val="-21178"/>
+            <a:alphaOff val="0"/>
+          </a:schemeClr>
+        </a:solidFill>
+        <a:ln w="22225" cap="rnd" cmpd="sng" algn="ctr">
+          <a:solidFill>
+            <a:schemeClr val="lt1">
+              <a:hueOff val="0"/>
+              <a:satOff val="0"/>
+              <a:lumOff val="0"/>
+              <a:alphaOff val="0"/>
+            </a:schemeClr>
+          </a:solidFill>
+          <a:prstDash val="solid"/>
+        </a:ln>
+        <a:effectLst/>
+      </dsp:spPr>
+      <dsp:style>
+        <a:lnRef idx="2">
+          <a:scrgbClr r="0" g="0" b="0"/>
+        </a:lnRef>
+        <a:fillRef idx="1">
+          <a:scrgbClr r="0" g="0" b="0"/>
+        </a:fillRef>
+        <a:effectRef idx="0">
+          <a:scrgbClr r="0" g="0" b="0"/>
+        </a:effectRef>
+        <a:fontRef idx="minor">
+          <a:schemeClr val="lt1"/>
+        </a:fontRef>
+      </dsp:style>
+      <dsp:txBody>
+        <a:bodyPr spcFirstLastPara="0" vert="horz" wrap="square" lIns="76200" tIns="76200" rIns="76200" bIns="76200" numCol="1" spcCol="1270" anchor="ctr" anchorCtr="0">
+          <a:noAutofit/>
+        </a:bodyPr>
+        <a:lstStyle/>
+        <a:p>
+          <a:pPr marL="0" lvl="0" indent="0" algn="ctr" defTabSz="889000">
+            <a:lnSpc>
+              <a:spcPct val="90000"/>
+            </a:lnSpc>
+            <a:spcBef>
+              <a:spcPct val="0"/>
+            </a:spcBef>
+            <a:spcAft>
+              <a:spcPct val="35000"/>
+            </a:spcAft>
+            <a:buNone/>
+          </a:pPr>
+          <a:r>
+            <a:rPr lang="es-MX" sz="2000" kern="1200" dirty="0"/>
+            <a:t>Modelo de </a:t>
+          </a:r>
+          <a:r>
+            <a:rPr lang="es-MX" sz="2000" kern="1200" dirty="0" err="1"/>
+            <a:t>Keras</a:t>
+          </a:r>
+          <a:endParaRPr lang="es-MX" sz="2000" kern="1200" dirty="0"/>
+        </a:p>
+      </dsp:txBody>
+      <dsp:txXfrm>
+        <a:off x="2635507" y="488"/>
+        <a:ext cx="1160774" cy="696464"/>
+      </dsp:txXfrm>
+    </dsp:sp>
+  </dsp:spTree>
+</dsp:drawing>
+</file>
+
+<file path=ppt/diagrams/layout1.xml><?xml version="1.0" encoding="utf-8"?>
+<dgm:layoutDef xmlns:dgm="http://schemas.openxmlformats.org/drawingml/2006/diagram" xmlns:a="http://schemas.openxmlformats.org/drawingml/2006/main" uniqueId="urn:microsoft.com/office/officeart/2005/8/layout/default">
+  <dgm:title val=""/>
+  <dgm:desc val=""/>
+  <dgm:catLst>
+    <dgm:cat type="list" pri="400"/>
+  </dgm:catLst>
+  <dgm:sampData>
+    <dgm:dataModel>
+      <dgm:ptLst>
+        <dgm:pt modelId="0" type="doc"/>
+        <dgm:pt modelId="1">
+          <dgm:prSet phldr="1"/>
+        </dgm:pt>
+        <dgm:pt modelId="2">
+          <dgm:prSet phldr="1"/>
+        </dgm:pt>
+        <dgm:pt modelId="3">
+          <dgm:prSet phldr="1"/>
+        </dgm:pt>
+        <dgm:pt modelId="4">
+          <dgm:prSet phldr="1"/>
+        </dgm:pt>
+        <dgm:pt modelId="5">
+          <dgm:prSet phldr="1"/>
+        </dgm:pt>
+      </dgm:ptLst>
+      <dgm:cxnLst>
+        <dgm:cxn modelId="6" srcId="0" destId="1" srcOrd="0" destOrd="0"/>
+        <dgm:cxn modelId="7" srcId="0" destId="2" srcOrd="1" destOrd="0"/>
+        <dgm:cxn modelId="8" srcId="0" destId="3" srcOrd="2" destOrd="0"/>
+        <dgm:cxn modelId="9" srcId="0" destId="4" srcOrd="3" destOrd="0"/>
+        <dgm:cxn modelId="10" srcId="0" destId="5" srcOrd="4" destOrd="0"/>
+      </dgm:cxnLst>
+      <dgm:bg/>
+      <dgm:whole/>
+    </dgm:dataModel>
+  </dgm:sampData>
+  <dgm:styleData>
+    <dgm:dataModel>
+      <dgm:ptLst>
+        <dgm:pt modelId="0" type="doc"/>
+        <dgm:pt modelId="1"/>
+        <dgm:pt modelId="2"/>
+      </dgm:ptLst>
+      <dgm:cxnLst>
+        <dgm:cxn modelId="3" srcId="0" destId="1" srcOrd="0" destOrd="0"/>
+        <dgm:cxn modelId="4" srcId="0" destId="2" srcOrd="1" destOrd="0"/>
+      </dgm:cxnLst>
+      <dgm:bg/>
+      <dgm:whole/>
+    </dgm:dataModel>
+  </dgm:styleData>
+  <dgm:clrData>
+    <dgm:dataModel>
+      <dgm:ptLst>
+        <dgm:pt modelId="0" type="doc"/>
+        <dgm:pt modelId="1"/>
+        <dgm:pt modelId="2"/>
+        <dgm:pt modelId="3"/>
+        <dgm:pt modelId="4"/>
+        <dgm:pt modelId="5"/>
+        <dgm:pt modelId="6"/>
+      </dgm:ptLst>
+      <dgm:cxnLst>
+        <dgm:cxn modelId="7" srcId="0" destId="1" srcOrd="0" destOrd="0"/>
+        <dgm:cxn modelId="8" srcId="0" destId="2" srcOrd="1" destOrd="0"/>
+        <dgm:cxn modelId="9" srcId="0" destId="3" srcOrd="2" destOrd="0"/>
+        <dgm:cxn modelId="10" srcId="0" destId="4" srcOrd="3" destOrd="0"/>
+        <dgm:cxn modelId="11" srcId="0" destId="5" srcOrd="4" destOrd="0"/>
+        <dgm:cxn modelId="12" srcId="0" destId="6" srcOrd="5" destOrd="0"/>
+      </dgm:cxnLst>
+      <dgm:bg/>
+      <dgm:whole/>
+    </dgm:dataModel>
+  </dgm:clrData>
+  <dgm:layoutNode name="diagram">
+    <dgm:varLst>
+      <dgm:dir/>
+      <dgm:resizeHandles val="exact"/>
+    </dgm:varLst>
+    <dgm:choose name="Name0">
+      <dgm:if name="Name1" func="var" arg="dir" op="equ" val="norm">
+        <dgm:alg type="snake">
+          <dgm:param type="grDir" val="tL"/>
+          <dgm:param type="flowDir" val="row"/>
+          <dgm:param type="contDir" val="sameDir"/>
+          <dgm:param type="off" val="ctr"/>
+        </dgm:alg>
+      </dgm:if>
+      <dgm:else name="Name2">
+        <dgm:alg type="snake">
+          <dgm:param type="grDir" val="tR"/>
+          <dgm:param type="flowDir" val="row"/>
+          <dgm:param type="contDir" val="sameDir"/>
+          <dgm:param type="off" val="ctr"/>
+        </dgm:alg>
+      </dgm:else>
+    </dgm:choose>
+    <dgm:shape xmlns:r="http://schemas.openxmlformats.org/officeDocument/2006/relationships" r:blip="">
+      <dgm:adjLst/>
+    </dgm:shape>
+    <dgm:presOf/>
+    <dgm:constrLst>
+      <dgm:constr type="w" for="ch" forName="node" refType="w"/>
+      <dgm:constr type="h" for="ch" forName="node" refType="w" refFor="ch" refForName="node" fact="0.6"/>
+      <dgm:constr type="w" for="ch" forName="sibTrans" refType="w" refFor="ch" refForName="node" fact="0.1"/>
+      <dgm:constr type="sp" refType="w" refFor="ch" refForName="sibTrans"/>
+      <dgm:constr type="primFontSz" for="ch" forName="node" op="equ" val="65"/>
+    </dgm:constrLst>
+    <dgm:ruleLst/>
+    <dgm:forEach name="Name3" axis="ch" ptType="node">
+      <dgm:layoutNode name="node">
+        <dgm:varLst>
+          <dgm:bulletEnabled val="1"/>
+        </dgm:varLst>
+        <dgm:alg type="tx"/>
+        <dgm:shape xmlns:r="http://schemas.openxmlformats.org/officeDocument/2006/relationships" type="rect" r:blip="">
+          <dgm:adjLst/>
+        </dgm:shape>
+        <dgm:presOf axis="desOrSelf" ptType="node"/>
+        <dgm:constrLst>
+          <dgm:constr type="lMarg" refType="primFontSz" fact="0.3"/>
+          <dgm:constr type="rMarg" refType="primFontSz" fact="0.3"/>
+          <dgm:constr type="tMarg" refType="primFontSz" fact="0.3"/>
+          <dgm:constr type="bMarg" refType="primFontSz" fact="0.3"/>
+        </dgm:constrLst>
+        <dgm:ruleLst>
+          <dgm:rule type="primFontSz" val="5" fact="NaN" max="NaN"/>
+        </dgm:ruleLst>
+      </dgm:layoutNode>
+      <dgm:forEach name="Name4" axis="followSib" ptType="sibTrans" cnt="1">
+        <dgm:layoutNode name="sibTrans">
+          <dgm:alg type="sp"/>
+          <dgm:shape xmlns:r="http://schemas.openxmlformats.org/officeDocument/2006/relationships" r:blip="">
+            <dgm:adjLst/>
+          </dgm:shape>
+          <dgm:presOf/>
+          <dgm:constrLst/>
+          <dgm:ruleLst/>
+        </dgm:layoutNode>
+      </dgm:forEach>
+    </dgm:forEach>
+  </dgm:layoutNode>
+</dgm:layoutDef>
+</file>
+
+<file path=ppt/diagrams/quickStyle1.xml><?xml version="1.0" encoding="utf-8"?>
+<dgm:styleDef xmlns:dgm="http://schemas.openxmlformats.org/drawingml/2006/diagram" xmlns:a="http://schemas.openxmlformats.org/drawingml/2006/main" uniqueId="urn:microsoft.com/office/officeart/2005/8/quickstyle/simple1">
+  <dgm:title val=""/>
+  <dgm:desc val=""/>
+  <dgm:catLst>
+    <dgm:cat type="simple" pri="10100"/>
+  </dgm:catLst>
+  <dgm:scene3d>
+    <a:camera prst="orthographicFront"/>
+    <a:lightRig rig="threePt" dir="t"/>
+  </dgm:scene3d>
+  <dgm:styleLbl name="node0">
+    <dgm:scene3d>
+      <a:camera prst="orthographicFront"/>
+      <a:lightRig rig="threePt" dir="t"/>
+    </dgm:scene3d>
+    <dgm:sp3d/>
+    <dgm:txPr/>
+    <dgm:style>
+      <a:lnRef idx="2">
+        <a:scrgbClr r="0" g="0" b="0"/>
+      </a:lnRef>
+      <a:fillRef idx="1">
+        <a:scrgbClr r="0" g="0" b="0"/>
+      </a:fillRef>
+      <a:effectRef idx="0">
+        <a:scrgbClr r="0" g="0" b="0"/>
+      </a:effectRef>
+      <a:fontRef idx="minor">
+        <a:schemeClr val="lt1"/>
+      </a:fontRef>
+    </dgm:style>
+  </dgm:styleLbl>
+  <dgm:styleLbl name="lnNode1">
+    <dgm:scene3d>
+      <a:camera prst="orthographicFront"/>
+      <a:lightRig rig="threePt" dir="t"/>
+    </dgm:scene3d>
+    <dgm:sp3d/>
+    <dgm:txPr/>
+    <dgm:style>
+      <a:lnRef idx="2">
+        <a:scrgbClr r="0" g="0" b="0"/>
+      </a:lnRef>
+      <a:fillRef idx="1">
+        <a:scrgbClr r="0" g="0" b="0"/>
+      </a:fillRef>
+      <a:effectRef idx="0">
+        <a:scrgbClr r="0" g="0" b="0"/>
+      </a:effectRef>
+      <a:fontRef idx="minor">
+        <a:schemeClr val="lt1"/>
+      </a:fontRef>
+    </dgm:style>
+  </dgm:styleLbl>
+  <dgm:styleLbl name="vennNode1">
+    <dgm:scene3d>
+      <a:camera prst="orthographicFront"/>
+      <a:lightRig rig="threePt" dir="t"/>
+    </dgm:scene3d>
+    <dgm:sp3d/>
+    <dgm:txPr/>
+    <dgm:style>
+      <a:lnRef idx="2">
+        <a:scrgbClr r="0" g="0" b="0"/>
+      </a:lnRef>
+      <a:fillRef idx="1">
+        <a:scrgbClr r="0" g="0" b="0"/>
+      </a:fillRef>
+      <a:effectRef idx="0">
+        <a:scrgbClr r="0" g="0" b="0"/>
+      </a:effectRef>
+      <a:fontRef idx="minor">
+        <a:schemeClr val="tx1"/>
+      </a:fontRef>
+    </dgm:style>
+  </dgm:styleLbl>
+  <dgm:styleLbl name="alignNode1">
+    <dgm:scene3d>
+      <a:camera prst="orthographicFront"/>
+      <a:lightRig rig="threePt" dir="t"/>
+    </dgm:scene3d>
+    <dgm:sp3d/>
+    <dgm:txPr/>
+    <dgm:style>
+      <a:lnRef idx="2">
+        <a:scrgbClr r="0" g="0" b="0"/>
+      </a:lnRef>
+      <a:fillRef idx="1">
+        <a:scrgbClr r="0" g="0" b="0"/>
+      </a:fillRef>
+      <a:effectRef idx="0">
+        <a:scrgbClr r="0" g="0" b="0"/>
+      </a:effectRef>
+      <a:fontRef idx="minor">
+        <a:schemeClr val="lt1"/>
+      </a:fontRef>
+    </dgm:style>
+  </dgm:styleLbl>
+  <dgm:styleLbl name="node1">
+    <dgm:scene3d>
+      <a:camera prst="orthographicFront"/>
+      <a:lightRig rig="threePt" dir="t"/>
+    </dgm:scene3d>
+    <dgm:sp3d/>
+    <dgm:txPr/>
+    <dgm:style>
+      <a:lnRef idx="2">
+        <a:scrgbClr r="0" g="0" b="0"/>
+      </a:lnRef>
+      <a:fillRef idx="1">
+        <a:scrgbClr r="0" g="0" b="0"/>
+      </a:fillRef>
+      <a:effectRef idx="0">
+        <a:scrgbClr r="0" g="0" b="0"/>
+      </a:effectRef>
+      <a:fontRef idx="minor">
+        <a:schemeClr val="lt1"/>
+      </a:fontRef>
+    </dgm:style>
+  </dgm:styleLbl>
+  <dgm:styleLbl name="node2">
+    <dgm:scene3d>
+      <a:camera prst="orthographicFront"/>
+      <a:lightRig rig="threePt" dir="t"/>
+    </dgm:scene3d>
+    <dgm:sp3d/>
+    <dgm:txPr/>
+    <dgm:style>
+      <a:lnRef idx="2">
+        <a:scrgbClr r="0" g="0" b="0"/>
+      </a:lnRef>
+      <a:fillRef idx="1">
+        <a:scrgbClr r="0" g="0" b="0"/>
+      </a:fillRef>
+      <a:effectRef idx="0">
+        <a:scrgbClr r="0" g="0" b="0"/>
+      </a:effectRef>
+      <a:fontRef idx="minor">
+        <a:schemeClr val="lt1"/>
+      </a:fontRef>
+    </dgm:style>
+  </dgm:styleLbl>
+  <dgm:styleLbl name="node3">
+    <dgm:scene3d>
+      <a:camera prst="orthographicFront"/>
+      <a:lightRig rig="threePt" dir="t"/>
+    </dgm:scene3d>
+    <dgm:sp3d/>
+    <dgm:txPr/>
+    <dgm:style>
+      <a:lnRef idx="2">
+        <a:scrgbClr r="0" g="0" b="0"/>
+      </a:lnRef>
+      <a:fillRef idx="1">
+        <a:scrgbClr r="0" g="0" b="0"/>
+      </a:fillRef>
+      <a:effectRef idx="0">
+        <a:scrgbClr r="0" g="0" b="0"/>
+      </a:effectRef>
+      <a:fontRef idx="minor">
+        <a:schemeClr val="lt1"/>
+      </a:fontRef>
+    </dgm:style>
+  </dgm:styleLbl>
+  <dgm:styleLbl name="node4">
+    <dgm:scene3d>
+      <a:camera prst="orthographicFront"/>
+      <a:lightRig rig="threePt" dir="t"/>
+    </dgm:scene3d>
+    <dgm:sp3d/>
+    <dgm:txPr/>
+    <dgm:style>
+      <a:lnRef idx="2">
+        <a:scrgbClr r="0" g="0" b="0"/>
+      </a:lnRef>
+      <a:fillRef idx="1">
+        <a:scrgbClr r="0" g="0" b="0"/>
+      </a:fillRef>
+      <a:effectRef idx="0">
+        <a:scrgbClr r="0" g="0" b="0"/>
+      </a:effectRef>
+      <a:fontRef idx="minor">
+        <a:schemeClr val="lt1"/>
+      </a:fontRef>
+    </dgm:style>
+  </dgm:styleLbl>
+  <dgm:styleLbl name="fgImgPlace1">
+    <dgm:scene3d>
+      <a:camera prst="orthographicFront"/>
+      <a:lightRig rig="threePt" dir="t"/>
+    </dgm:scene3d>
+    <dgm:sp3d/>
+    <dgm:txPr/>
+    <dgm:style>
+      <a:lnRef idx="2">
+        <a:scrgbClr r="0" g="0" b="0"/>
+      </a:lnRef>
+      <a:fillRef idx="1">
+        <a:scrgbClr r="0" g="0" b="0"/>
+      </a:fillRef>
+      <a:effectRef idx="0">
+        <a:scrgbClr r="0" g="0" b="0"/>
+      </a:effectRef>
+      <a:fontRef idx="minor"/>
+    </dgm:style>
+  </dgm:styleLbl>
+  <dgm:styleLbl name="alignImgPlace1">
+    <dgm:scene3d>
+      <a:camera prst="orthographicFront"/>
+      <a:lightRig rig="threePt" dir="t"/>
+    </dgm:scene3d>
+    <dgm:sp3d/>
+    <dgm:txPr/>
+    <dgm:style>
+      <a:lnRef idx="2">
+        <a:scrgbClr r="0" g="0" b="0"/>
+      </a:lnRef>
+      <a:fillRef idx="1">
+        <a:scrgbClr r="0" g="0" b="0"/>
+      </a:fillRef>
+      <a:effectRef idx="0">
+        <a:scrgbClr r="0" g="0" b="0"/>
+      </a:effectRef>
+      <a:fontRef idx="minor"/>
+    </dgm:style>
+  </dgm:styleLbl>
+  <dgm:styleLbl name="bgImgPlace1">
+    <dgm:scene3d>
+      <a:camera prst="orthographicFront"/>
+      <a:lightRig rig="threePt" dir="t"/>
+    </dgm:scene3d>
+    <dgm:sp3d/>
+    <dgm:txPr/>
+    <dgm:style>
+      <a:lnRef idx="2">
+        <a:scrgbClr r="0" g="0" b="0"/>
+      </a:lnRef>
+      <a:fillRef idx="1">
+        <a:scrgbClr r="0" g="0" b="0"/>
+      </a:fillRef>
+      <a:effectRef idx="0">
+        <a:scrgbClr r="0" g="0" b="0"/>
+      </a:effectRef>
+      <a:fontRef idx="minor"/>
+    </dgm:style>
+  </dgm:styleLbl>
+  <dgm:styleLbl name="sibTrans2D1">
+    <dgm:scene3d>
+      <a:camera prst="orthographicFront"/>
+      <a:lightRig rig="threePt" dir="t"/>
+    </dgm:scene3d>
+    <dgm:sp3d/>
+    <dgm:txPr/>
+    <dgm:style>
+      <a:lnRef idx="0">
+        <a:scrgbClr r="0" g="0" b="0"/>
+      </a:lnRef>
+      <a:fillRef idx="1">
+        <a:scrgbClr r="0" g="0" b="0"/>
+      </a:fillRef>
+      <a:effectRef idx="0">
+        <a:scrgbClr r="0" g="0" b="0"/>
+      </a:effectRef>
+      <a:fontRef idx="minor">
+        <a:schemeClr val="lt1"/>
+      </a:fontRef>
+    </dgm:style>
+  </dgm:styleLbl>
+  <dgm:styleLbl name="fgSibTrans2D1">
+    <dgm:scene3d>
+      <a:camera prst="orthographicFront"/>
+      <a:lightRig rig="threePt" dir="t"/>
+    </dgm:scene3d>
+    <dgm:sp3d/>
+    <dgm:txPr/>
+    <dgm:style>
+      <a:lnRef idx="0">
+        <a:scrgbClr r="0" g="0" b="0"/>
+      </a:lnRef>
+      <a:fillRef idx="1">
+        <a:scrgbClr r="0" g="0" b="0"/>
+      </a:fillRef>
+      <a:effectRef idx="0">
+        <a:scrgbClr r="0" g="0" b="0"/>
+      </a:effectRef>
+      <a:fontRef idx="minor">
+        <a:schemeClr val="lt1"/>
+      </a:fontRef>
+    </dgm:style>
+  </dgm:styleLbl>
+  <dgm:styleLbl name="bgSibTrans2D1">
+    <dgm:scene3d>
+      <a:camera prst="orthographicFront"/>
+      <a:lightRig rig="threePt" dir="t"/>
+    </dgm:scene3d>
+    <dgm:sp3d/>
+    <dgm:txPr/>
+    <dgm:style>
+      <a:lnRef idx="0">
+        <a:scrgbClr r="0" g="0" b="0"/>
+      </a:lnRef>
+      <a:fillRef idx="1">
+        <a:scrgbClr r="0" g="0" b="0"/>
+      </a:fillRef>
+      <a:effectRef idx="0">
+        <a:scrgbClr r="0" g="0" b="0"/>
+      </a:effectRef>
+      <a:fontRef idx="minor">
+        <a:schemeClr val="lt1"/>
+      </a:fontRef>
+    </dgm:style>
+  </dgm:styleLbl>
+  <dgm:styleLbl name="sibTrans1D1">
+    <dgm:scene3d>
+      <a:camera prst="orthographicFront"/>
+      <a:lightRig rig="threePt" dir="t"/>
+    </dgm:scene3d>
+    <dgm:sp3d/>
+    <dgm:txPr/>
+    <dgm:style>
+      <a:lnRef idx="1">
+        <a:scrgbClr r="0" g="0" b="0"/>
+      </a:lnRef>
+      <a:fillRef idx="0">
+        <a:scrgbClr r="0" g="0" b="0"/>
+      </a:fillRef>
+      <a:effectRef idx="0">
+        <a:scrgbClr r="0" g="0" b="0"/>
+      </a:effectRef>
+      <a:fontRef idx="minor"/>
+    </dgm:style>
+  </dgm:styleLbl>
+  <dgm:styleLbl name="callout">
+    <dgm:scene3d>
+      <a:camera prst="orthographicFront"/>
+      <a:lightRig rig="threePt" dir="t"/>
+    </dgm:scene3d>
+    <dgm:sp3d/>
+    <dgm:txPr/>
+    <dgm:style>
+      <a:lnRef idx="2">
+        <a:scrgbClr r="0" g="0" b="0"/>
+      </a:lnRef>
+      <a:fillRef idx="1">
+        <a:scrgbClr r="0" g="0" b="0"/>
+      </a:fillRef>
+      <a:effectRef idx="0">
+        <a:scrgbClr r="0" g="0" b="0"/>
+      </a:effectRef>
+      <a:fontRef idx="minor"/>
+    </dgm:style>
+  </dgm:styleLbl>
+  <dgm:styleLbl name="asst0">
+    <dgm:scene3d>
+      <a:camera prst="orthographicFront"/>
+      <a:lightRig rig="threePt" dir="t"/>
+    </dgm:scene3d>
+    <dgm:sp3d/>
+    <dgm:txPr/>
+    <dgm:style>
+      <a:lnRef idx="2">
+        <a:scrgbClr r="0" g="0" b="0"/>
+      </a:lnRef>
+      <a:fillRef idx="1">
+        <a:scrgbClr r="0" g="0" b="0"/>
+      </a:fillRef>
+      <a:effectRef idx="0">
+        <a:scrgbClr r="0" g="0" b="0"/>
+      </a:effectRef>
+      <a:fontRef idx="minor">
+        <a:schemeClr val="lt1"/>
+      </a:fontRef>
+    </dgm:style>
+  </dgm:styleLbl>
+  <dgm:styleLbl name="asst1">
+    <dgm:scene3d>
+      <a:camera prst="orthographicFront"/>
+      <a:lightRig rig="threePt" dir="t"/>
+    </dgm:scene3d>
+    <dgm:sp3d/>
+    <dgm:txPr/>
+    <dgm:style>
+      <a:lnRef idx="2">
+        <a:scrgbClr r="0" g="0" b="0"/>
+      </a:lnRef>
+      <a:fillRef idx="1">
+        <a:scrgbClr r="0" g="0" b="0"/>
+      </a:fillRef>
+      <a:effectRef idx="0">
+        <a:scrgbClr r="0" g="0" b="0"/>
+      </a:effectRef>
+      <a:fontRef idx="minor">
+        <a:schemeClr val="lt1"/>
+      </a:fontRef>
+    </dgm:style>
+  </dgm:styleLbl>
+  <dgm:styleLbl name="asst2">
+    <dgm:scene3d>
+      <a:camera prst="orthographicFront"/>
+      <a:lightRig rig="threePt" dir="t"/>
+    </dgm:scene3d>
+    <dgm:sp3d/>
+    <dgm:txPr/>
+    <dgm:style>
+      <a:lnRef idx="2">
+        <a:scrgbClr r="0" g="0" b="0"/>
+      </a:lnRef>
+      <a:fillRef idx="1">
+        <a:scrgbClr r="0" g="0" b="0"/>
+      </a:fillRef>
+      <a:effectRef idx="0">
+        <a:scrgbClr r="0" g="0" b="0"/>
+      </a:effectRef>
+      <a:fontRef idx="minor">
+        <a:schemeClr val="lt1"/>
+      </a:fontRef>
+    </dgm:style>
+  </dgm:styleLbl>
+  <dgm:styleLbl name="asst3">
+    <dgm:scene3d>
+      <a:camera prst="orthographicFront"/>
+      <a:lightRig rig="threePt" dir="t"/>
+    </dgm:scene3d>
+    <dgm:sp3d/>
+    <dgm:txPr/>
+    <dgm:style>
+      <a:lnRef idx="2">
+        <a:scrgbClr r="0" g="0" b="0"/>
+      </a:lnRef>
+      <a:fillRef idx="1">
+        <a:scrgbClr r="0" g="0" b="0"/>
+      </a:fillRef>
+      <a:effectRef idx="0">
+        <a:scrgbClr r="0" g="0" b="0"/>
+      </a:effectRef>
+      <a:fontRef idx="minor">
+        <a:schemeClr val="lt1"/>
+      </a:fontRef>
+    </dgm:style>
+  </dgm:styleLbl>
+  <dgm:styleLbl name="asst4">
+    <dgm:scene3d>
+      <a:camera prst="orthographicFront"/>
+      <a:lightRig rig="threePt" dir="t"/>
+    </dgm:scene3d>
+    <dgm:sp3d/>
+    <dgm:txPr/>
+    <dgm:style>
+      <a:lnRef idx="2">
+        <a:scrgbClr r="0" g="0" b="0"/>
+      </a:lnRef>
+      <a:fillRef idx="1">
+        <a:scrgbClr r="0" g="0" b="0"/>
+      </a:fillRef>
+      <a:effectRef idx="0">
+        <a:scrgbClr r="0" g="0" b="0"/>
+      </a:effectRef>
+      <a:fontRef idx="minor">
+        <a:schemeClr val="lt1"/>
+      </a:fontRef>
+    </dgm:style>
+  </dgm:styleLbl>
+  <dgm:styleLbl name="parChTrans2D1">
+    <dgm:scene3d>
+      <a:camera prst="orthographicFront"/>
+      <a:lightRig rig="threePt" dir="t"/>
+    </dgm:scene3d>
+    <dgm:sp3d/>
+    <dgm:txPr/>
+    <dgm:style>
+      <a:lnRef idx="2">
+        <a:scrgbClr r="0" g="0" b="0"/>
+      </a:lnRef>
+      <a:fillRef idx="1">
+        <a:scrgbClr r="0" g="0" b="0"/>
+      </a:fillRef>
+      <a:effectRef idx="0">
+        <a:scrgbClr r="0" g="0" b="0"/>
+      </a:effectRef>
+      <a:fontRef idx="minor">
+        <a:schemeClr val="lt1"/>
+      </a:fontRef>
+    </dgm:style>
+  </dgm:styleLbl>
+  <dgm:styleLbl name="parChTrans2D2">
+    <dgm:scene3d>
+      <a:camera prst="orthographicFront"/>
+      <a:lightRig rig="threePt" dir="t"/>
+    </dgm:scene3d>
+    <dgm:sp3d/>
+    <dgm:txPr/>
+    <dgm:style>
+      <a:lnRef idx="2">
+        <a:scrgbClr r="0" g="0" b="0"/>
+      </a:lnRef>
+      <a:fillRef idx="1">
+        <a:scrgbClr r="0" g="0" b="0"/>
+      </a:fillRef>
+      <a:effectRef idx="0">
+        <a:scrgbClr r="0" g="0" b="0"/>
+      </a:effectRef>
+      <a:fontRef idx="minor">
+        <a:schemeClr val="lt1"/>
+      </a:fontRef>
+    </dgm:style>
+  </dgm:styleLbl>
+  <dgm:styleLbl name="parChTrans2D3">
+    <dgm:scene3d>
+      <a:camera prst="orthographicFront"/>
+      <a:lightRig rig="threePt" dir="t"/>
+    </dgm:scene3d>
+    <dgm:sp3d/>
+    <dgm:txPr/>
+    <dgm:style>
+      <a:lnRef idx="2">
+        <a:scrgbClr r="0" g="0" b="0"/>
+      </a:lnRef>
+      <a:fillRef idx="1">
+        <a:scrgbClr r="0" g="0" b="0"/>
+      </a:fillRef>
+      <a:effectRef idx="0">
+        <a:scrgbClr r="0" g="0" b="0"/>
+      </a:effectRef>
+      <a:fontRef idx="minor">
+        <a:schemeClr val="lt1"/>
+      </a:fontRef>
+    </dgm:style>
+  </dgm:styleLbl>
+  <dgm:styleLbl name="parChTrans2D4">
+    <dgm:scene3d>
+      <a:camera prst="orthographicFront"/>
+      <a:lightRig rig="threePt" dir="t"/>
+    </dgm:scene3d>
+    <dgm:sp3d/>
+    <dgm:txPr/>
+    <dgm:style>
+      <a:lnRef idx="2">
+        <a:scrgbClr r="0" g="0" b="0"/>
+      </a:lnRef>
+      <a:fillRef idx="1">
+        <a:scrgbClr r="0" g="0" b="0"/>
+      </a:fillRef>
+      <a:effectRef idx="0">
+        <a:scrgbClr r="0" g="0" b="0"/>
+      </a:effectRef>
+      <a:fontRef idx="minor">
+        <a:schemeClr val="lt1"/>
+      </a:fontRef>
+    </dgm:style>
+  </dgm:styleLbl>
+  <dgm:styleLbl name="parChTrans1D1">
+    <dgm:scene3d>
+      <a:camera prst="orthographicFront"/>
+      <a:lightRig rig="threePt" dir="t"/>
+    </dgm:scene3d>
+    <dgm:sp3d/>
+    <dgm:txPr/>
+    <dgm:style>
+      <a:lnRef idx="2">
+        <a:scrgbClr r="0" g="0" b="0"/>
+      </a:lnRef>
+      <a:fillRef idx="0">
+        <a:scrgbClr r="0" g="0" b="0"/>
+      </a:fillRef>
+      <a:effectRef idx="0">
+        <a:scrgbClr r="0" g="0" b="0"/>
+      </a:effectRef>
+      <a:fontRef idx="minor"/>
+    </dgm:style>
+  </dgm:styleLbl>
+  <dgm:styleLbl name="parChTrans1D2">
+    <dgm:scene3d>
+      <a:camera prst="orthographicFront"/>
+      <a:lightRig rig="threePt" dir="t"/>
+    </dgm:scene3d>
+    <dgm:sp3d/>
+    <dgm:txPr/>
+    <dgm:style>
+      <a:lnRef idx="2">
+        <a:scrgbClr r="0" g="0" b="0"/>
+      </a:lnRef>
+      <a:fillRef idx="0">
+        <a:scrgbClr r="0" g="0" b="0"/>
+      </a:fillRef>
+      <a:effectRef idx="0">
+        <a:scrgbClr r="0" g="0" b="0"/>
+      </a:effectRef>
+      <a:fontRef idx="minor"/>
+    </dgm:style>
+  </dgm:styleLbl>
+  <dgm:styleLbl name="parChTrans1D3">
+    <dgm:scene3d>
+      <a:camera prst="orthographicFront"/>
+      <a:lightRig rig="threePt" dir="t"/>
+    </dgm:scene3d>
+    <dgm:sp3d/>
+    <dgm:txPr/>
+    <dgm:style>
+      <a:lnRef idx="2">
+        <a:scrgbClr r="0" g="0" b="0"/>
+      </a:lnRef>
+      <a:fillRef idx="0">
+        <a:scrgbClr r="0" g="0" b="0"/>
+      </a:fillRef>
+      <a:effectRef idx="0">
+        <a:scrgbClr r="0" g="0" b="0"/>
+      </a:effectRef>
+      <a:fontRef idx="minor"/>
+    </dgm:style>
+  </dgm:styleLbl>
+  <dgm:styleLbl name="parChTrans1D4">
+    <dgm:scene3d>
+      <a:camera prst="orthographicFront"/>
+      <a:lightRig rig="threePt" dir="t"/>
+    </dgm:scene3d>
+    <dgm:sp3d/>
+    <dgm:txPr/>
+    <dgm:style>
+      <a:lnRef idx="2">
+        <a:scrgbClr r="0" g="0" b="0"/>
+      </a:lnRef>
+      <a:fillRef idx="0">
+        <a:scrgbClr r="0" g="0" b="0"/>
+      </a:fillRef>
+      <a:effectRef idx="0">
+        <a:scrgbClr r="0" g="0" b="0"/>
+      </a:effectRef>
+      <a:fontRef idx="minor"/>
+    </dgm:style>
+  </dgm:styleLbl>
+  <dgm:styleLbl name="fgAcc1">
+    <dgm:scene3d>
+      <a:camera prst="orthographicFront"/>
+      <a:lightRig rig="threePt" dir="t"/>
+    </dgm:scene3d>
+    <dgm:sp3d/>
+    <dgm:txPr/>
+    <dgm:style>
+      <a:lnRef idx="2">
+        <a:scrgbClr r="0" g="0" b="0"/>
+      </a:lnRef>
+      <a:fillRef idx="1">
+        <a:scrgbClr r="0" g="0" b="0"/>
+      </a:fillRef>
+      <a:effectRef idx="0">
+        <a:scrgbClr r="0" g="0" b="0"/>
+      </a:effectRef>
+      <a:fontRef idx="minor"/>
+    </dgm:style>
+  </dgm:styleLbl>
+  <dgm:styleLbl name="conFgAcc1">
+    <dgm:scene3d>
+      <a:camera prst="orthographicFront"/>
+      <a:lightRig rig="threePt" dir="t"/>
+    </dgm:scene3d>
+    <dgm:sp3d/>
+    <dgm:txPr/>
+    <dgm:style>
+      <a:lnRef idx="2">
+        <a:scrgbClr r="0" g="0" b="0"/>
+      </a:lnRef>
+      <a:fillRef idx="1">
+        <a:scrgbClr r="0" g="0" b="0"/>
+      </a:fillRef>
+      <a:effectRef idx="0">
+        <a:scrgbClr r="0" g="0" b="0"/>
+      </a:effectRef>
+      <a:fontRef idx="minor"/>
+    </dgm:style>
+  </dgm:styleLbl>
+  <dgm:styleLbl name="alignAcc1">
+    <dgm:scene3d>
+      <a:camera prst="orthographicFront"/>
+      <a:lightRig rig="threePt" dir="t"/>
+    </dgm:scene3d>
+    <dgm:sp3d/>
+    <dgm:txPr/>
+    <dgm:style>
+      <a:lnRef idx="2">
+        <a:scrgbClr r="0" g="0" b="0"/>
+      </a:lnRef>
+      <a:fillRef idx="1">
+        <a:scrgbClr r="0" g="0" b="0"/>
+      </a:fillRef>
+      <a:effectRef idx="0">
+        <a:scrgbClr r="0" g="0" b="0"/>
+      </a:effectRef>
+      <a:fontRef idx="minor"/>
+    </dgm:style>
+  </dgm:styleLbl>
+  <dgm:styleLbl name="trAlignAcc1">
+    <dgm:scene3d>
+      <a:camera prst="orthographicFront"/>
+      <a:lightRig rig="threePt" dir="t"/>
+    </dgm:scene3d>
+    <dgm:sp3d/>
+    <dgm:txPr/>
+    <dgm:style>
+      <a:lnRef idx="1">
+        <a:scrgbClr r="0" g="0" b="0"/>
+      </a:lnRef>
+      <a:fillRef idx="1">
+        <a:scrgbClr r="0" g="0" b="0"/>
+      </a:fillRef>
+      <a:effectRef idx="0">
+        <a:scrgbClr r="0" g="0" b="0"/>
+      </a:effectRef>
+      <a:fontRef idx="minor"/>
+    </dgm:style>
+  </dgm:styleLbl>
+  <dgm:styleLbl name="bgAcc1">
+    <dgm:scene3d>
+      <a:camera prst="orthographicFront"/>
+      <a:lightRig rig="threePt" dir="t"/>
+    </dgm:scene3d>
+    <dgm:sp3d/>
+    <dgm:txPr/>
+    <dgm:style>
+      <a:lnRef idx="2">
+        <a:scrgbClr r="0" g="0" b="0"/>
+      </a:lnRef>
+      <a:fillRef idx="1">
+        <a:scrgbClr r="0" g="0" b="0"/>
+      </a:fillRef>
+      <a:effectRef idx="0">
+        <a:scrgbClr r="0" g="0" b="0"/>
+      </a:effectRef>
+      <a:fontRef idx="minor"/>
+    </dgm:style>
+  </dgm:styleLbl>
+  <dgm:styleLbl name="solidFgAcc1">
+    <dgm:scene3d>
+      <a:camera prst="orthographicFront"/>
+      <a:lightRig rig="threePt" dir="t"/>
+    </dgm:scene3d>
+    <dgm:sp3d/>
+    <dgm:txPr/>
+    <dgm:style>
+      <a:lnRef idx="2">
+        <a:scrgbClr r="0" g="0" b="0"/>
+      </a:lnRef>
+      <a:fillRef idx="1">
+        <a:scrgbClr r="0" g="0" b="0"/>
+      </a:fillRef>
+      <a:effectRef idx="0">
+        <a:scrgbClr r="0" g="0" b="0"/>
+      </a:effectRef>
+      <a:fontRef idx="minor"/>
+    </dgm:style>
+  </dgm:styleLbl>
+  <dgm:styleLbl name="solidAlignAcc1">
+    <dgm:scene3d>
+      <a:camera prst="orthographicFront"/>
+      <a:lightRig rig="threePt" dir="t"/>
+    </dgm:scene3d>
+    <dgm:sp3d/>
+    <dgm:txPr/>
+    <dgm:style>
+      <a:lnRef idx="2">
+        <a:scrgbClr r="0" g="0" b="0"/>
+      </a:lnRef>
+      <a:fillRef idx="1">
+        <a:scrgbClr r="0" g="0" b="0"/>
+      </a:fillRef>
+      <a:effectRef idx="0">
+        <a:scrgbClr r="0" g="0" b="0"/>
+      </a:effectRef>
+      <a:fontRef idx="minor"/>
+    </dgm:style>
+  </dgm:styleLbl>
+  <dgm:styleLbl name="solidBgAcc1">
+    <dgm:scene3d>
+      <a:camera prst="orthographicFront"/>
+      <a:lightRig rig="threePt" dir="t"/>
+    </dgm:scene3d>
+    <dgm:sp3d/>
+    <dgm:txPr/>
+    <dgm:style>
+      <a:lnRef idx="2">
+        <a:scrgbClr r="0" g="0" b="0"/>
+      </a:lnRef>
+      <a:fillRef idx="1">
+        <a:scrgbClr r="0" g="0" b="0"/>
+      </a:fillRef>
+      <a:effectRef idx="0">
+        <a:scrgbClr r="0" g="0" b="0"/>
+      </a:effectRef>
+      <a:fontRef idx="minor"/>
+    </dgm:style>
+  </dgm:styleLbl>
+  <dgm:styleLbl name="fgAccFollowNode1">
+    <dgm:scene3d>
+      <a:camera prst="orthographicFront"/>
+      <a:lightRig rig="threePt" dir="t"/>
+    </dgm:scene3d>
+    <dgm:sp3d/>
+    <dgm:txPr/>
+    <dgm:style>
+      <a:lnRef idx="2">
+        <a:scrgbClr r="0" g="0" b="0"/>
+      </a:lnRef>
+      <a:fillRef idx="1">
+        <a:scrgbClr r="0" g="0" b="0"/>
+      </a:fillRef>
+      <a:effectRef idx="0">
+        <a:scrgbClr r="0" g="0" b="0"/>
+      </a:effectRef>
+      <a:fontRef idx="minor"/>
+    </dgm:style>
+  </dgm:styleLbl>
+  <dgm:styleLbl name="alignAccFollowNode1">
+    <dgm:scene3d>
+      <a:camera prst="orthographicFront"/>
+      <a:lightRig rig="threePt" dir="t"/>
+    </dgm:scene3d>
+    <dgm:sp3d/>
+    <dgm:txPr/>
+    <dgm:style>
+      <a:lnRef idx="2">
+        <a:scrgbClr r="0" g="0" b="0"/>
+      </a:lnRef>
+      <a:fillRef idx="1">
+        <a:scrgbClr r="0" g="0" b="0"/>
+      </a:fillRef>
+      <a:effectRef idx="0">
+        <a:scrgbClr r="0" g="0" b="0"/>
+      </a:effectRef>
+      <a:fontRef idx="minor"/>
+    </dgm:style>
+  </dgm:styleLbl>
+  <dgm:styleLbl name="bgAccFollowNode1">
+    <dgm:scene3d>
+      <a:camera prst="orthographicFront"/>
+      <a:lightRig rig="threePt" dir="t"/>
+    </dgm:scene3d>
+    <dgm:sp3d/>
+    <dgm:txPr/>
+    <dgm:style>
+      <a:lnRef idx="2">
+        <a:scrgbClr r="0" g="0" b="0"/>
+      </a:lnRef>
+      <a:fillRef idx="1">
+        <a:scrgbClr r="0" g="0" b="0"/>
+      </a:fillRef>
+      <a:effectRef idx="0">
+        <a:scrgbClr r="0" g="0" b="0"/>
+      </a:effectRef>
+      <a:fontRef idx="minor"/>
+    </dgm:style>
+  </dgm:styleLbl>
+  <dgm:styleLbl name="fgAcc0">
+    <dgm:scene3d>
+      <a:camera prst="orthographicFront"/>
+      <a:lightRig rig="threePt" dir="t"/>
+    </dgm:scene3d>
+    <dgm:sp3d/>
+    <dgm:txPr/>
+    <dgm:style>
+      <a:lnRef idx="2">
+        <a:scrgbClr r="0" g="0" b="0"/>
+      </a:lnRef>
+      <a:fillRef idx="1">
+        <a:scrgbClr r="0" g="0" b="0"/>
+      </a:fillRef>
+      <a:effectRef idx="0">
+        <a:scrgbClr r="0" g="0" b="0"/>
+      </a:effectRef>
+      <a:fontRef idx="minor"/>
+    </dgm:style>
+  </dgm:styleLbl>
+  <dgm:styleLbl name="fgAcc2">
+    <dgm:scene3d>
+      <a:camera prst="orthographicFront"/>
+      <a:lightRig rig="threePt" dir="t"/>
+    </dgm:scene3d>
+    <dgm:sp3d/>
+    <dgm:txPr/>
+    <dgm:style>
+      <a:lnRef idx="2">
+        <a:scrgbClr r="0" g="0" b="0"/>
+      </a:lnRef>
+      <a:fillRef idx="1">
+        <a:scrgbClr r="0" g="0" b="0"/>
+      </a:fillRef>
+      <a:effectRef idx="0">
+        <a:scrgbClr r="0" g="0" b="0"/>
+      </a:effectRef>
+      <a:fontRef idx="minor"/>
+    </dgm:style>
+  </dgm:styleLbl>
+  <dgm:styleLbl name="fgAcc3">
+    <dgm:scene3d>
+      <a:camera prst="orthographicFront"/>
+      <a:lightRig rig="threePt" dir="t"/>
+    </dgm:scene3d>
+    <dgm:sp3d/>
+    <dgm:txPr/>
+    <dgm:style>
+      <a:lnRef idx="2">
+        <a:scrgbClr r="0" g="0" b="0"/>
+      </a:lnRef>
+      <a:fillRef idx="1">
+        <a:scrgbClr r="0" g="0" b="0"/>
+      </a:fillRef>
+      <a:effectRef idx="0">
+        <a:scrgbClr r="0" g="0" b="0"/>
+      </a:effectRef>
+      <a:fontRef idx="minor"/>
+    </dgm:style>
+  </dgm:styleLbl>
+  <dgm:styleLbl name="fgAcc4">
+    <dgm:scene3d>
+      <a:camera prst="orthographicFront"/>
+      <a:lightRig rig="threePt" dir="t"/>
+    </dgm:scene3d>
+    <dgm:sp3d/>
+    <dgm:txPr/>
+    <dgm:style>
+      <a:lnRef idx="2">
+        <a:scrgbClr r="0" g="0" b="0"/>
+      </a:lnRef>
+      <a:fillRef idx="1">
+        <a:scrgbClr r="0" g="0" b="0"/>
+      </a:fillRef>
+      <a:effectRef idx="0">
+        <a:scrgbClr r="0" g="0" b="0"/>
+      </a:effectRef>
+      <a:fontRef idx="minor"/>
+    </dgm:style>
+  </dgm:styleLbl>
+  <dgm:styleLbl name="bgShp">
+    <dgm:scene3d>
+      <a:camera prst="orthographicFront"/>
+      <a:lightRig rig="threePt" dir="t"/>
+    </dgm:scene3d>
+    <dgm:sp3d/>
+    <dgm:txPr/>
+    <dgm:style>
+      <a:lnRef idx="0">
+        <a:scrgbClr r="0" g="0" b="0"/>
+      </a:lnRef>
+      <a:fillRef idx="1">
+        <a:scrgbClr r="0" g="0" b="0"/>
+      </a:fillRef>
+      <a:effectRef idx="0">
+        <a:scrgbClr r="0" g="0" b="0"/>
+      </a:effectRef>
+      <a:fontRef idx="minor"/>
+    </dgm:style>
+  </dgm:styleLbl>
+  <dgm:styleLbl name="dkBgShp">
+    <dgm:scene3d>
+      <a:camera prst="orthographicFront"/>
+      <a:lightRig rig="threePt" dir="t"/>
+    </dgm:scene3d>
+    <dgm:sp3d/>
+    <dgm:txPr/>
+    <dgm:style>
+      <a:lnRef idx="0">
+        <a:scrgbClr r="0" g="0" b="0"/>
+      </a:lnRef>
+      <a:fillRef idx="1">
+        <a:scrgbClr r="0" g="0" b="0"/>
+      </a:fillRef>
+      <a:effectRef idx="0">
+        <a:scrgbClr r="0" g="0" b="0"/>
+      </a:effectRef>
+      <a:fontRef idx="minor"/>
+    </dgm:style>
+  </dgm:styleLbl>
+  <dgm:styleLbl name="trBgShp">
+    <dgm:scene3d>
+      <a:camera prst="orthographicFront"/>
+      <a:lightRig rig="threePt" dir="t"/>
+    </dgm:scene3d>
+    <dgm:sp3d/>
+    <dgm:txPr/>
+    <dgm:style>
+      <a:lnRef idx="0">
+        <a:scrgbClr r="0" g="0" b="0"/>
+      </a:lnRef>
+      <a:fillRef idx="1">
+        <a:scrgbClr r="0" g="0" b="0"/>
+      </a:fillRef>
+      <a:effectRef idx="0">
+        <a:scrgbClr r="0" g="0" b="0"/>
+      </a:effectRef>
+      <a:fontRef idx="minor"/>
+    </dgm:style>
+  </dgm:styleLbl>
+  <dgm:styleLbl name="fgShp">
+    <dgm:scene3d>
+      <a:camera prst="orthographicFront"/>
+      <a:lightRig rig="threePt" dir="t"/>
+    </dgm:scene3d>
+    <dgm:sp3d/>
+    <dgm:txPr/>
+    <dgm:style>
+      <a:lnRef idx="2">
+        <a:scrgbClr r="0" g="0" b="0"/>
+      </a:lnRef>
+      <a:fillRef idx="1">
+        <a:scrgbClr r="0" g="0" b="0"/>
+      </a:fillRef>
+      <a:effectRef idx="0">
+        <a:scrgbClr r="0" g="0" b="0"/>
+      </a:effectRef>
+      <a:fontRef idx="minor"/>
+    </dgm:style>
+  </dgm:styleLbl>
+  <dgm:styleLbl name="revTx">
+    <dgm:scene3d>
+      <a:camera prst="orthographicFront"/>
+      <a:lightRig rig="threePt" dir="t"/>
+    </dgm:scene3d>
+    <dgm:sp3d/>
+    <dgm:txPr/>
+    <dgm:style>
+      <a:lnRef idx="0">
+        <a:scrgbClr r="0" g="0" b="0"/>
+      </a:lnRef>
+      <a:fillRef idx="0">
+        <a:scrgbClr r="0" g="0" b="0"/>
+      </a:fillRef>
+      <a:effectRef idx="0">
+        <a:scrgbClr r="0" g="0" b="0"/>
+      </a:effectRef>
+      <a:fontRef idx="minor"/>
+    </dgm:style>
+  </dgm:styleLbl>
+</dgm:styleDef>
 </file>
 
 <file path=ppt/notesMasters/notesMaster1.xml><?xml version="1.0" encoding="utf-8"?>
@@ -1013,7 +3420,7 @@
           </a:p>
           <a:p>
             <a:r>
-              <a:rPr lang="es-MX"/>
+              <a:rPr lang="es-MX" dirty="0"/>
               <a:t>mejoras</a:t>
             </a:r>
           </a:p>
@@ -27939,48 +30346,12 @@
           </a:p>
         </p:txBody>
       </p:sp>
-      <p:sp>
-        <p:nvSpPr>
-          <p:cNvPr id="4" name="Marcador de contenido 3">
+      <p:pic>
+        <p:nvPicPr>
+          <p:cNvPr id="2" name="Picture 2" descr="DPRCelebratesEarthDay2021 - Twitter Search">
             <a:extLst>
               <a:ext uri="{FF2B5EF4-FFF2-40B4-BE49-F238E27FC236}">
-                <a16:creationId xmlns:a16="http://schemas.microsoft.com/office/drawing/2014/main" id="{7DD1AC38-65A2-4873-83FF-4404E664D049}"/>
-              </a:ext>
-            </a:extLst>
-          </p:cNvPr>
-          <p:cNvSpPr>
-            <a:spLocks noGrp="1"/>
-          </p:cNvSpPr>
-          <p:nvPr>
-            <p:ph idx="1"/>
-          </p:nvPr>
-        </p:nvSpPr>
-        <p:spPr>
-          <a:xfrm>
-            <a:off x="581192" y="2180496"/>
-            <a:ext cx="11029615" cy="1060337"/>
-          </a:xfrm>
-        </p:spPr>
-        <p:txBody>
-          <a:bodyPr/>
-          <a:lstStyle/>
-          <a:p>
-            <a:r>
-              <a:rPr lang="es-MX" b="1" dirty="0"/>
-              <a:t>¿Por qué es importante poder clasificar una araña? </a:t>
-            </a:r>
-          </a:p>
-          <a:p>
-            <a:endParaRPr lang="es-MX" dirty="0"/>
-          </a:p>
-        </p:txBody>
-      </p:sp>
-      <p:pic>
-        <p:nvPicPr>
-          <p:cNvPr id="1026" name="Picture 2" descr="14,850 Cute Spider Illustrations &amp;amp; Clip Art - iStock">
-            <a:extLst>
-              <a:ext uri="{FF2B5EF4-FFF2-40B4-BE49-F238E27FC236}">
-                <a16:creationId xmlns:a16="http://schemas.microsoft.com/office/drawing/2014/main" id="{FDACFAA3-A49D-4BA4-AC12-93A41488634B}"/>
+                <a16:creationId xmlns:a16="http://schemas.microsoft.com/office/drawing/2014/main" id="{3AC2E55C-01BF-4AE8-8090-D4F649CB78F3}"/>
               </a:ext>
             </a:extLst>
           </p:cNvPr>
@@ -28004,8 +30375,55 @@
         </p:blipFill>
         <p:spPr bwMode="auto">
           <a:xfrm>
-            <a:off x="6669351" y="1994439"/>
-            <a:ext cx="4161405" cy="4161405"/>
+            <a:off x="581192" y="2494581"/>
+            <a:ext cx="3804708" cy="3801188"/>
+          </a:xfrm>
+          <a:prstGeom prst="rect">
+            <a:avLst/>
+          </a:prstGeom>
+          <a:noFill/>
+          <a:extLst>
+            <a:ext uri="{909E8E84-426E-40DD-AFC4-6F175D3DCCD1}">
+              <a14:hiddenFill xmlns:a14="http://schemas.microsoft.com/office/drawing/2010/main">
+                <a:solidFill>
+                  <a:srgbClr val="FFFFFF"/>
+                </a:solidFill>
+              </a14:hiddenFill>
+            </a:ext>
+          </a:extLst>
+        </p:spPr>
+      </p:pic>
+      <p:pic>
+        <p:nvPicPr>
+          <p:cNvPr id="5" name="Picture 4" descr="Bites and Stings: Pictures, Causes, and Symptoms">
+            <a:extLst>
+              <a:ext uri="{FF2B5EF4-FFF2-40B4-BE49-F238E27FC236}">
+                <a16:creationId xmlns:a16="http://schemas.microsoft.com/office/drawing/2014/main" id="{53918483-766B-4884-BE6D-877D279A7351}"/>
+              </a:ext>
+            </a:extLst>
+          </p:cNvPr>
+          <p:cNvPicPr>
+            <a:picLocks noChangeAspect="1" noChangeArrowheads="1"/>
+          </p:cNvPicPr>
+          <p:nvPr/>
+        </p:nvPicPr>
+        <p:blipFill>
+          <a:blip r:embed="rId4">
+            <a:extLst>
+              <a:ext uri="{28A0092B-C50C-407E-A947-70E740481C1C}">
+                <a14:useLocalDpi xmlns:a14="http://schemas.microsoft.com/office/drawing/2010/main" val="0"/>
+              </a:ext>
+            </a:extLst>
+          </a:blip>
+          <a:srcRect/>
+          <a:stretch>
+            <a:fillRect/>
+          </a:stretch>
+        </p:blipFill>
+        <p:spPr bwMode="auto">
+          <a:xfrm>
+            <a:off x="7317420" y="4018319"/>
+            <a:ext cx="4518555" cy="2535085"/>
           </a:xfrm>
           <a:prstGeom prst="rect">
             <a:avLst/>
@@ -28037,7 +30455,7 @@
           <p:nvPr/>
         </p:nvPicPr>
         <p:blipFill>
-          <a:blip r:embed="rId4">
+          <a:blip r:embed="rId5">
             <a:extLst>
               <a:ext uri="{28A0092B-C50C-407E-A947-70E740481C1C}">
                 <a14:useLocalDpi xmlns:a14="http://schemas.microsoft.com/office/drawing/2010/main" val="0"/>
@@ -28051,8 +30469,55 @@
         </p:blipFill>
         <p:spPr bwMode="auto">
           <a:xfrm>
-            <a:off x="3809259" y="3089503"/>
-            <a:ext cx="2413254" cy="3217672"/>
+            <a:off x="5076642" y="2832831"/>
+            <a:ext cx="2038716" cy="2718288"/>
+          </a:xfrm>
+          <a:prstGeom prst="rect">
+            <a:avLst/>
+          </a:prstGeom>
+          <a:noFill/>
+          <a:extLst>
+            <a:ext uri="{909E8E84-426E-40DD-AFC4-6F175D3DCCD1}">
+              <a14:hiddenFill xmlns:a14="http://schemas.microsoft.com/office/drawing/2010/main">
+                <a:solidFill>
+                  <a:srgbClr val="FFFFFF"/>
+                </a:solidFill>
+              </a14:hiddenFill>
+            </a:ext>
+          </a:extLst>
+        </p:spPr>
+      </p:pic>
+      <p:pic>
+        <p:nvPicPr>
+          <p:cNvPr id="1032" name="Picture 8" descr="Spider Clipart Black And White - Incy Wincy Spider Cartoon PNG Image |  Transparent PNG Free Download on SeekPNG">
+            <a:extLst>
+              <a:ext uri="{FF2B5EF4-FFF2-40B4-BE49-F238E27FC236}">
+                <a16:creationId xmlns:a16="http://schemas.microsoft.com/office/drawing/2014/main" id="{132EFCA5-2F82-476F-B0F8-3C8389F9991C}"/>
+              </a:ext>
+            </a:extLst>
+          </p:cNvPr>
+          <p:cNvPicPr>
+            <a:picLocks noChangeAspect="1" noChangeArrowheads="1"/>
+          </p:cNvPicPr>
+          <p:nvPr/>
+        </p:nvPicPr>
+        <p:blipFill>
+          <a:blip r:embed="rId6">
+            <a:extLst>
+              <a:ext uri="{28A0092B-C50C-407E-A947-70E740481C1C}">
+                <a14:useLocalDpi xmlns:a14="http://schemas.microsoft.com/office/drawing/2010/main" val="0"/>
+              </a:ext>
+            </a:extLst>
+          </a:blip>
+          <a:srcRect/>
+          <a:stretch>
+            <a:fillRect/>
+          </a:stretch>
+        </p:blipFill>
+        <p:spPr bwMode="auto">
+          <a:xfrm>
+            <a:off x="8037688" y="2108428"/>
+            <a:ext cx="2882895" cy="1764894"/>
           </a:xfrm>
           <a:prstGeom prst="rect">
             <a:avLst/>
@@ -28156,7 +30621,7 @@
         </p:blipFill>
         <p:spPr bwMode="auto">
           <a:xfrm>
-            <a:off x="581192" y="2124196"/>
+            <a:off x="1992100" y="2237085"/>
             <a:ext cx="4103900" cy="4031648"/>
           </a:xfrm>
           <a:prstGeom prst="rect">
@@ -28188,7 +30653,7 @@
         </p:nvSpPr>
         <p:spPr>
           <a:xfrm>
-            <a:off x="4574357" y="2178386"/>
+            <a:off x="6459601" y="3284697"/>
             <a:ext cx="6094428" cy="1200329"/>
           </a:xfrm>
           <a:prstGeom prst="rect">
@@ -28317,28 +30782,190 @@
           </a:p>
         </p:txBody>
       </p:sp>
-      <p:sp>
-        <p:nvSpPr>
-          <p:cNvPr id="3" name="Marcador de contenido 2">
+      <p:graphicFrame>
+        <p:nvGraphicFramePr>
+          <p:cNvPr id="4" name="Marcador de contenido 3">
             <a:extLst>
               <a:ext uri="{FF2B5EF4-FFF2-40B4-BE49-F238E27FC236}">
-                <a16:creationId xmlns:a16="http://schemas.microsoft.com/office/drawing/2014/main" id="{6DD66433-51B2-49AD-996A-CE87935BB021}"/>
+                <a16:creationId xmlns:a16="http://schemas.microsoft.com/office/drawing/2014/main" id="{F41D1EBC-84B6-4997-9A3C-BFC0AC44B484}"/>
               </a:ext>
             </a:extLst>
           </p:cNvPr>
-          <p:cNvSpPr>
-            <a:spLocks noGrp="1"/>
-          </p:cNvSpPr>
+          <p:cNvGraphicFramePr>
+            <a:graphicFrameLocks noGrp="1"/>
+          </p:cNvGraphicFramePr>
           <p:nvPr>
             <p:ph idx="1"/>
+            <p:extLst>
+              <p:ext uri="{D42A27DB-BD31-4B8C-83A1-F6EECF244321}">
+                <p14:modId xmlns:p14="http://schemas.microsoft.com/office/powerpoint/2010/main" val="3815797813"/>
+              </p:ext>
+            </p:extLst>
           </p:nvPr>
+        </p:nvGraphicFramePr>
+        <p:xfrm>
+          <a:off x="581192" y="3114917"/>
+          <a:ext cx="3878085" cy="697442"/>
+        </p:xfrm>
+        <a:graphic>
+          <a:graphicData uri="http://schemas.openxmlformats.org/drawingml/2006/diagram">
+            <dgm:relIds xmlns:dgm="http://schemas.openxmlformats.org/drawingml/2006/diagram" xmlns:r="http://schemas.openxmlformats.org/officeDocument/2006/relationships" r:dm="rId2" r:lo="rId3" r:qs="rId4" r:cs="rId5"/>
+          </a:graphicData>
+        </a:graphic>
+      </p:graphicFrame>
+      <p:sp>
+        <p:nvSpPr>
+          <p:cNvPr id="6" name="Símbolo &quot;No permitido&quot; 5">
+            <a:extLst>
+              <a:ext uri="{FF2B5EF4-FFF2-40B4-BE49-F238E27FC236}">
+                <a16:creationId xmlns:a16="http://schemas.microsoft.com/office/drawing/2014/main" id="{9DD934D8-A5EA-4808-B5CE-6599D7F58108}"/>
+              </a:ext>
+            </a:extLst>
+          </p:cNvPr>
+          <p:cNvSpPr/>
+          <p:nvPr/>
         </p:nvSpPr>
-        <p:spPr/>
+        <p:spPr>
+          <a:xfrm>
+            <a:off x="4459277" y="3056003"/>
+            <a:ext cx="756356" cy="756356"/>
+          </a:xfrm>
+          <a:prstGeom prst="noSmoking">
+            <a:avLst/>
+          </a:prstGeom>
+        </p:spPr>
+        <p:style>
+          <a:lnRef idx="2">
+            <a:schemeClr val="accent1">
+              <a:shade val="50000"/>
+            </a:schemeClr>
+          </a:lnRef>
+          <a:fillRef idx="1">
+            <a:schemeClr val="accent1"/>
+          </a:fillRef>
+          <a:effectRef idx="0">
+            <a:schemeClr val="accent1"/>
+          </a:effectRef>
+          <a:fontRef idx="minor">
+            <a:schemeClr val="lt1"/>
+          </a:fontRef>
+        </p:style>
         <p:txBody>
-          <a:bodyPr/>
+          <a:bodyPr rtlCol="0" anchor="ctr"/>
           <a:lstStyle/>
           <a:p>
-            <a:endParaRPr lang="es-MX"/>
+            <a:pPr algn="ctr"/>
+            <a:endParaRPr lang="es-MX">
+              <a:solidFill>
+                <a:schemeClr val="tx1"/>
+              </a:solidFill>
+            </a:endParaRPr>
+          </a:p>
+        </p:txBody>
+      </p:sp>
+      <p:sp>
+        <p:nvSpPr>
+          <p:cNvPr id="8" name="CuadroTexto 7">
+            <a:extLst>
+              <a:ext uri="{FF2B5EF4-FFF2-40B4-BE49-F238E27FC236}">
+                <a16:creationId xmlns:a16="http://schemas.microsoft.com/office/drawing/2014/main" id="{56BB812F-AF82-434F-A7B3-0B295239238E}"/>
+              </a:ext>
+            </a:extLst>
+          </p:cNvPr>
+          <p:cNvSpPr txBox="1"/>
+          <p:nvPr/>
+        </p:nvSpPr>
+        <p:spPr>
+          <a:xfrm>
+            <a:off x="581192" y="4218715"/>
+            <a:ext cx="4496744" cy="923330"/>
+          </a:xfrm>
+          <a:prstGeom prst="rect">
+            <a:avLst/>
+          </a:prstGeom>
+          <a:noFill/>
+        </p:spPr>
+        <p:txBody>
+          <a:bodyPr wrap="none" rtlCol="0">
+            <a:spAutoFit/>
+          </a:bodyPr>
+          <a:lstStyle/>
+          <a:p>
+            <a:r>
+              <a:rPr lang="es-MX" sz="5400" b="1" dirty="0"/>
+              <a:t>MobileNetV2</a:t>
+            </a:r>
+          </a:p>
+        </p:txBody>
+      </p:sp>
+      <p:pic>
+        <p:nvPicPr>
+          <p:cNvPr id="14" name="Imagen 13" descr="Diagrama&#10;&#10;Descripción generada automáticamente">
+            <a:extLst>
+              <a:ext uri="{FF2B5EF4-FFF2-40B4-BE49-F238E27FC236}">
+                <a16:creationId xmlns:a16="http://schemas.microsoft.com/office/drawing/2014/main" id="{C360515E-A33D-4F4A-B34D-824F241D3E19}"/>
+              </a:ext>
+            </a:extLst>
+          </p:cNvPr>
+          <p:cNvPicPr>
+            <a:picLocks noChangeAspect="1"/>
+          </p:cNvPicPr>
+          <p:nvPr/>
+        </p:nvPicPr>
+        <p:blipFill>
+          <a:blip r:embed="rId7">
+            <a:extLst>
+              <a:ext uri="{28A0092B-C50C-407E-A947-70E740481C1C}">
+                <a14:useLocalDpi xmlns:a14="http://schemas.microsoft.com/office/drawing/2010/main" val="0"/>
+              </a:ext>
+            </a:extLst>
+          </a:blip>
+          <a:stretch>
+            <a:fillRect/>
+          </a:stretch>
+        </p:blipFill>
+        <p:spPr>
+          <a:xfrm>
+            <a:off x="6096000" y="1783265"/>
+            <a:ext cx="5288176" cy="4870900"/>
+          </a:xfrm>
+          <a:prstGeom prst="rect">
+            <a:avLst/>
+          </a:prstGeom>
+        </p:spPr>
+      </p:pic>
+      <p:sp>
+        <p:nvSpPr>
+          <p:cNvPr id="15" name="CuadroTexto 14">
+            <a:extLst>
+              <a:ext uri="{FF2B5EF4-FFF2-40B4-BE49-F238E27FC236}">
+                <a16:creationId xmlns:a16="http://schemas.microsoft.com/office/drawing/2014/main" id="{CA951A1E-1571-499B-9687-214C9E1894BA}"/>
+              </a:ext>
+            </a:extLst>
+          </p:cNvPr>
+          <p:cNvSpPr txBox="1"/>
+          <p:nvPr/>
+        </p:nvSpPr>
+        <p:spPr>
+          <a:xfrm>
+            <a:off x="9550401" y="1783265"/>
+            <a:ext cx="530915" cy="369332"/>
+          </a:xfrm>
+          <a:prstGeom prst="rect">
+            <a:avLst/>
+          </a:prstGeom>
+          <a:noFill/>
+        </p:spPr>
+        <p:txBody>
+          <a:bodyPr wrap="none" rtlCol="0">
+            <a:spAutoFit/>
+          </a:bodyPr>
+          <a:lstStyle/>
+          <a:p>
+            <a:r>
+              <a:rPr lang="es-MX" dirty="0"/>
+              <a:t>x17</a:t>
+            </a:r>
           </a:p>
         </p:txBody>
       </p:sp>
@@ -28715,32 +31342,417 @@
           <a:p>
             <a:r>
               <a:rPr lang="es-MX" dirty="0"/>
-              <a:t>Resultados (Comparativo)</a:t>
+              <a:t>Resultados: comparativo</a:t>
             </a:r>
+          </a:p>
+        </p:txBody>
+      </p:sp>
+      <p:graphicFrame>
+        <p:nvGraphicFramePr>
+          <p:cNvPr id="4" name="Tabla 4">
+            <a:extLst>
+              <a:ext uri="{FF2B5EF4-FFF2-40B4-BE49-F238E27FC236}">
+                <a16:creationId xmlns:a16="http://schemas.microsoft.com/office/drawing/2014/main" id="{E8C54E9F-5BBB-4A3D-90AF-5A0D4FE9E15D}"/>
+              </a:ext>
+            </a:extLst>
+          </p:cNvPr>
+          <p:cNvGraphicFramePr>
+            <a:graphicFrameLocks noGrp="1"/>
+          </p:cNvGraphicFramePr>
+          <p:nvPr>
+            <p:ph idx="1"/>
+            <p:extLst>
+              <p:ext uri="{D42A27DB-BD31-4B8C-83A1-F6EECF244321}">
+                <p14:modId xmlns:p14="http://schemas.microsoft.com/office/powerpoint/2010/main" val="2295136080"/>
+              </p:ext>
+            </p:extLst>
+          </p:nvPr>
+        </p:nvGraphicFramePr>
+        <p:xfrm>
+          <a:off x="2517421" y="2664177"/>
+          <a:ext cx="9093387" cy="2940715"/>
+        </p:xfrm>
+        <a:graphic>
+          <a:graphicData uri="http://schemas.openxmlformats.org/drawingml/2006/table">
+            <a:tbl>
+              <a:tblPr firstRow="1" bandRow="1">
+                <a:tableStyleId>{5C22544A-7EE6-4342-B048-85BDC9FD1C3A}</a:tableStyleId>
+              </a:tblPr>
+              <a:tblGrid>
+                <a:gridCol w="3031129">
+                  <a:extLst>
+                    <a:ext uri="{9D8B030D-6E8A-4147-A177-3AD203B41FA5}">
+                      <a16:colId xmlns:a16="http://schemas.microsoft.com/office/drawing/2014/main" val="2071449499"/>
+                    </a:ext>
+                  </a:extLst>
+                </a:gridCol>
+                <a:gridCol w="3031129">
+                  <a:extLst>
+                    <a:ext uri="{9D8B030D-6E8A-4147-A177-3AD203B41FA5}">
+                      <a16:colId xmlns:a16="http://schemas.microsoft.com/office/drawing/2014/main" val="2524240206"/>
+                    </a:ext>
+                  </a:extLst>
+                </a:gridCol>
+                <a:gridCol w="3031129">
+                  <a:extLst>
+                    <a:ext uri="{9D8B030D-6E8A-4147-A177-3AD203B41FA5}">
+                      <a16:colId xmlns:a16="http://schemas.microsoft.com/office/drawing/2014/main" val="2572820561"/>
+                    </a:ext>
+                  </a:extLst>
+                </a:gridCol>
+              </a:tblGrid>
+              <a:tr h="588143">
+                <a:tc>
+                  <a:txBody>
+                    <a:bodyPr/>
+                    <a:lstStyle/>
+                    <a:p>
+                      <a:r>
+                        <a:rPr lang="es-MX" dirty="0" err="1"/>
+                        <a:t>Author</a:t>
+                      </a:r>
+                      <a:endParaRPr lang="es-MX" dirty="0"/>
+                    </a:p>
+                  </a:txBody>
+                  <a:tcPr/>
+                </a:tc>
+                <a:tc>
+                  <a:txBody>
+                    <a:bodyPr/>
+                    <a:lstStyle/>
+                    <a:p>
+                      <a:r>
+                        <a:rPr lang="es-MX" dirty="0" err="1"/>
+                        <a:t>Model</a:t>
+                      </a:r>
+                      <a:endParaRPr lang="es-MX" dirty="0"/>
+                    </a:p>
+                  </a:txBody>
+                  <a:tcPr/>
+                </a:tc>
+                <a:tc>
+                  <a:txBody>
+                    <a:bodyPr/>
+                    <a:lstStyle/>
+                    <a:p>
+                      <a:r>
+                        <a:rPr lang="es-MX" dirty="0"/>
+                        <a:t>Top </a:t>
+                      </a:r>
+                      <a:r>
+                        <a:rPr lang="es-MX" dirty="0" err="1"/>
+                        <a:t>Accuracy</a:t>
+                      </a:r>
+                      <a:endParaRPr lang="es-MX" dirty="0"/>
+                    </a:p>
+                  </a:txBody>
+                  <a:tcPr/>
+                </a:tc>
+                <a:extLst>
+                  <a:ext uri="{0D108BD9-81ED-4DB2-BD59-A6C34878D82A}">
+                    <a16:rowId xmlns:a16="http://schemas.microsoft.com/office/drawing/2014/main" val="2466821602"/>
+                  </a:ext>
+                </a:extLst>
+              </a:tr>
+              <a:tr h="588143">
+                <a:tc>
+                  <a:txBody>
+                    <a:bodyPr/>
+                    <a:lstStyle/>
+                    <a:p>
+                      <a:r>
+                        <a:rPr lang="es-MX" dirty="0" err="1"/>
+                        <a:t>Sinnott</a:t>
+                      </a:r>
+                      <a:r>
+                        <a:rPr lang="es-MX" dirty="0"/>
+                        <a:t>, Yang &amp; Ye</a:t>
+                      </a:r>
+                    </a:p>
+                  </a:txBody>
+                  <a:tcPr/>
+                </a:tc>
+                <a:tc>
+                  <a:txBody>
+                    <a:bodyPr/>
+                    <a:lstStyle/>
+                    <a:p>
+                      <a:r>
+                        <a:rPr lang="es-MX" dirty="0" err="1"/>
+                        <a:t>Xception</a:t>
+                      </a:r>
+                      <a:endParaRPr lang="es-MX" dirty="0"/>
+                    </a:p>
+                  </a:txBody>
+                  <a:tcPr/>
+                </a:tc>
+                <a:tc>
+                  <a:txBody>
+                    <a:bodyPr/>
+                    <a:lstStyle/>
+                    <a:p>
+                      <a:r>
+                        <a:rPr lang="es-MX" dirty="0"/>
+                        <a:t>.9042</a:t>
+                      </a:r>
+                    </a:p>
+                  </a:txBody>
+                  <a:tcPr/>
+                </a:tc>
+                <a:extLst>
+                  <a:ext uri="{0D108BD9-81ED-4DB2-BD59-A6C34878D82A}">
+                    <a16:rowId xmlns:a16="http://schemas.microsoft.com/office/drawing/2014/main" val="3340353279"/>
+                  </a:ext>
+                </a:extLst>
+              </a:tr>
+              <a:tr h="588143">
+                <a:tc>
+                  <a:txBody>
+                    <a:bodyPr/>
+                    <a:lstStyle/>
+                    <a:p>
+                      <a:pPr marL="0" marR="0" lvl="0" indent="0" algn="l" defTabSz="457200" rtl="0" eaLnBrk="1" fontAlgn="auto" latinLnBrk="0" hangingPunct="1">
+                        <a:lnSpc>
+                          <a:spcPct val="100000"/>
+                        </a:lnSpc>
+                        <a:spcBef>
+                          <a:spcPts val="0"/>
+                        </a:spcBef>
+                        <a:spcAft>
+                          <a:spcPts val="0"/>
+                        </a:spcAft>
+                        <a:buClrTx/>
+                        <a:buSzTx/>
+                        <a:buFontTx/>
+                        <a:buNone/>
+                        <a:tabLst/>
+                        <a:defRPr/>
+                      </a:pPr>
+                      <a:r>
+                        <a:rPr lang="es-MX" dirty="0" err="1"/>
+                        <a:t>Sinnott</a:t>
+                      </a:r>
+                      <a:r>
+                        <a:rPr lang="es-MX" dirty="0"/>
+                        <a:t>, Yang &amp; Ye</a:t>
+                      </a:r>
+                    </a:p>
+                  </a:txBody>
+                  <a:tcPr/>
+                </a:tc>
+                <a:tc>
+                  <a:txBody>
+                    <a:bodyPr/>
+                    <a:lstStyle/>
+                    <a:p>
+                      <a:r>
+                        <a:rPr lang="es-MX" dirty="0"/>
+                        <a:t>MobileNetV2</a:t>
+                      </a:r>
+                    </a:p>
+                  </a:txBody>
+                  <a:tcPr/>
+                </a:tc>
+                <a:tc>
+                  <a:txBody>
+                    <a:bodyPr/>
+                    <a:lstStyle/>
+                    <a:p>
+                      <a:r>
+                        <a:rPr lang="es-MX" dirty="0"/>
+                        <a:t>.8755</a:t>
+                      </a:r>
+                    </a:p>
+                  </a:txBody>
+                  <a:tcPr/>
+                </a:tc>
+                <a:extLst>
+                  <a:ext uri="{0D108BD9-81ED-4DB2-BD59-A6C34878D82A}">
+                    <a16:rowId xmlns:a16="http://schemas.microsoft.com/office/drawing/2014/main" val="1978183695"/>
+                  </a:ext>
+                </a:extLst>
+              </a:tr>
+              <a:tr h="588143">
+                <a:tc>
+                  <a:txBody>
+                    <a:bodyPr/>
+                    <a:lstStyle/>
+                    <a:p>
+                      <a:r>
+                        <a:rPr lang="es-MX" dirty="0"/>
+                        <a:t>Enes </a:t>
+                      </a:r>
+                      <a:r>
+                        <a:rPr lang="es-MX" dirty="0" err="1"/>
+                        <a:t>Altun</a:t>
+                      </a:r>
+                      <a:endParaRPr lang="es-MX" dirty="0"/>
+                    </a:p>
+                  </a:txBody>
+                  <a:tcPr/>
+                </a:tc>
+                <a:tc>
+                  <a:txBody>
+                    <a:bodyPr/>
+                    <a:lstStyle/>
+                    <a:p>
+                      <a:r>
+                        <a:rPr lang="es-MX" dirty="0"/>
+                        <a:t>ResNet18</a:t>
+                      </a:r>
+                    </a:p>
+                  </a:txBody>
+                  <a:tcPr/>
+                </a:tc>
+                <a:tc>
+                  <a:txBody>
+                    <a:bodyPr/>
+                    <a:lstStyle/>
+                    <a:p>
+                      <a:r>
+                        <a:rPr lang="es-MX" dirty="0"/>
+                        <a:t>.90</a:t>
+                      </a:r>
+                    </a:p>
+                  </a:txBody>
+                  <a:tcPr/>
+                </a:tc>
+                <a:extLst>
+                  <a:ext uri="{0D108BD9-81ED-4DB2-BD59-A6C34878D82A}">
+                    <a16:rowId xmlns:a16="http://schemas.microsoft.com/office/drawing/2014/main" val="732836279"/>
+                  </a:ext>
+                </a:extLst>
+              </a:tr>
+              <a:tr h="588143">
+                <a:tc>
+                  <a:txBody>
+                    <a:bodyPr/>
+                    <a:lstStyle/>
+                    <a:p>
+                      <a:r>
+                        <a:rPr lang="es-MX" dirty="0"/>
+                        <a:t>Gerry</a:t>
+                      </a:r>
+                    </a:p>
+                  </a:txBody>
+                  <a:tcPr/>
+                </a:tc>
+                <a:tc>
+                  <a:txBody>
+                    <a:bodyPr/>
+                    <a:lstStyle/>
+                    <a:p>
+                      <a:r>
+                        <a:rPr lang="es-MX" dirty="0"/>
+                        <a:t>InceptionResNetV2</a:t>
+                      </a:r>
+                    </a:p>
+                  </a:txBody>
+                  <a:tcPr/>
+                </a:tc>
+                <a:tc>
+                  <a:txBody>
+                    <a:bodyPr/>
+                    <a:lstStyle/>
+                    <a:p>
+                      <a:r>
+                        <a:rPr lang="es-MX" dirty="0"/>
+                        <a:t>.98</a:t>
+                      </a:r>
+                    </a:p>
+                  </a:txBody>
+                  <a:tcPr/>
+                </a:tc>
+                <a:extLst>
+                  <a:ext uri="{0D108BD9-81ED-4DB2-BD59-A6C34878D82A}">
+                    <a16:rowId xmlns:a16="http://schemas.microsoft.com/office/drawing/2014/main" val="3394649164"/>
+                  </a:ext>
+                </a:extLst>
+              </a:tr>
+            </a:tbl>
+          </a:graphicData>
+        </a:graphic>
+      </p:graphicFrame>
+      <p:sp>
+        <p:nvSpPr>
+          <p:cNvPr id="5" name="CuadroTexto 4">
+            <a:extLst>
+              <a:ext uri="{FF2B5EF4-FFF2-40B4-BE49-F238E27FC236}">
+                <a16:creationId xmlns:a16="http://schemas.microsoft.com/office/drawing/2014/main" id="{76CCE6A2-951E-41A4-9F32-DC7273DF7EA2}"/>
+              </a:ext>
+            </a:extLst>
+          </p:cNvPr>
+          <p:cNvSpPr txBox="1"/>
+          <p:nvPr/>
+        </p:nvSpPr>
+        <p:spPr>
+          <a:xfrm>
+            <a:off x="372533" y="3176035"/>
+            <a:ext cx="1860924" cy="369332"/>
+          </a:xfrm>
+          <a:prstGeom prst="rect">
+            <a:avLst/>
+          </a:prstGeom>
+          <a:noFill/>
+        </p:spPr>
+        <p:txBody>
+          <a:bodyPr wrap="square" rtlCol="0">
+            <a:spAutoFit/>
+          </a:bodyPr>
+          <a:lstStyle/>
+          <a:p>
+            <a:r>
+              <a:rPr lang="es-MX" dirty="0"/>
+              <a:t>Diferente </a:t>
+            </a:r>
+            <a:r>
+              <a:rPr lang="es-MX" dirty="0" err="1"/>
+              <a:t>Dataset</a:t>
+            </a:r>
+            <a:endParaRPr lang="es-MX" dirty="0"/>
           </a:p>
         </p:txBody>
       </p:sp>
       <p:sp>
         <p:nvSpPr>
-          <p:cNvPr id="3" name="Marcador de contenido 2">
+          <p:cNvPr id="6" name="Abrir llave 5">
             <a:extLst>
               <a:ext uri="{FF2B5EF4-FFF2-40B4-BE49-F238E27FC236}">
-                <a16:creationId xmlns:a16="http://schemas.microsoft.com/office/drawing/2014/main" id="{67DADE0F-14E8-4D2A-A2C2-090E39480809}"/>
+                <a16:creationId xmlns:a16="http://schemas.microsoft.com/office/drawing/2014/main" id="{5D413A6D-699D-422C-9E76-B17D6CBD26AD}"/>
               </a:ext>
             </a:extLst>
           </p:cNvPr>
-          <p:cNvSpPr>
-            <a:spLocks noGrp="1"/>
-          </p:cNvSpPr>
-          <p:nvPr>
-            <p:ph idx="1"/>
-          </p:nvPr>
+          <p:cNvSpPr/>
+          <p:nvPr/>
         </p:nvSpPr>
-        <p:spPr/>
+        <p:spPr>
+          <a:xfrm>
+            <a:off x="2233457" y="3360701"/>
+            <a:ext cx="283924" cy="1016394"/>
+          </a:xfrm>
+          <a:prstGeom prst="leftBrace">
+            <a:avLst/>
+          </a:prstGeom>
+        </p:spPr>
+        <p:style>
+          <a:lnRef idx="1">
+            <a:schemeClr val="accent1"/>
+          </a:lnRef>
+          <a:fillRef idx="0">
+            <a:schemeClr val="accent1"/>
+          </a:fillRef>
+          <a:effectRef idx="0">
+            <a:schemeClr val="accent1"/>
+          </a:effectRef>
+          <a:fontRef idx="minor">
+            <a:schemeClr val="tx1"/>
+          </a:fontRef>
+        </p:style>
         <p:txBody>
-          <a:bodyPr/>
+          <a:bodyPr rtlCol="0" anchor="ctr"/>
           <a:lstStyle/>
           <a:p>
+            <a:pPr algn="ctr"/>
             <a:endParaRPr lang="es-MX"/>
           </a:p>
         </p:txBody>
@@ -28824,7 +31836,71 @@
           <a:bodyPr/>
           <a:lstStyle/>
           <a:p>
-            <a:endParaRPr lang="es-MX"/>
+            <a:r>
+              <a:rPr lang="es-MX" dirty="0"/>
+              <a:t>MobileNetV2 fue el mejor modelo para nosotros ya que exige menos costo computacional</a:t>
+            </a:r>
+          </a:p>
+          <a:p>
+            <a:r>
+              <a:rPr lang="es-MX" dirty="0"/>
+              <a:t>Nos ayudó trabajar con pesos de </a:t>
+            </a:r>
+            <a:r>
+              <a:rPr lang="es-MX" dirty="0" err="1"/>
+              <a:t>imagenet</a:t>
+            </a:r>
+            <a:r>
+              <a:rPr lang="es-MX" dirty="0"/>
+              <a:t> porque nuestro </a:t>
+            </a:r>
+            <a:r>
+              <a:rPr lang="es-MX" dirty="0" err="1"/>
+              <a:t>dataset</a:t>
+            </a:r>
+            <a:r>
+              <a:rPr lang="es-MX" dirty="0"/>
+              <a:t> no era muy grande</a:t>
+            </a:r>
+          </a:p>
+          <a:p>
+            <a:r>
+              <a:rPr lang="es-MX" dirty="0"/>
+              <a:t>Nuestro </a:t>
+            </a:r>
+            <a:r>
+              <a:rPr lang="es-MX" dirty="0" err="1"/>
+              <a:t>dataset</a:t>
+            </a:r>
+            <a:r>
+              <a:rPr lang="es-MX" dirty="0"/>
+              <a:t> es muy pequeño y con imágenes muy buenas, por lo que los resultados pueden no ser representativos. Necesitamos aplicar el </a:t>
+            </a:r>
+            <a:r>
+              <a:rPr lang="es-MX" dirty="0" err="1"/>
+              <a:t>dataset</a:t>
+            </a:r>
+            <a:r>
+              <a:rPr lang="es-MX" dirty="0"/>
+              <a:t>, pudiendo usar imágenes de Google.  </a:t>
+            </a:r>
+          </a:p>
+          <a:p>
+            <a:r>
+              <a:rPr lang="es-MX" dirty="0"/>
+              <a:t>No podemos rechazar la hipótesis de que VGG16 y </a:t>
+            </a:r>
+            <a:r>
+              <a:rPr lang="es-MX" dirty="0" err="1"/>
+              <a:t>Xception</a:t>
+            </a:r>
+            <a:r>
+              <a:rPr lang="es-MX" dirty="0"/>
+              <a:t> sean mejores modelos, en un equipo mejor podríamos hacer más pruebas.</a:t>
+            </a:r>
+          </a:p>
+          <a:p>
+            <a:endParaRPr lang="es-MX" dirty="0"/>
           </a:p>
         </p:txBody>
       </p:sp>
@@ -28832,6 +31908,550 @@
     <p:extLst>
       <p:ext uri="{BB962C8B-B14F-4D97-AF65-F5344CB8AC3E}">
         <p14:creationId xmlns:p14="http://schemas.microsoft.com/office/powerpoint/2010/main" val="3587975707"/>
+      </p:ext>
+    </p:extLst>
+  </p:cSld>
+  <p:clrMapOvr>
+    <a:masterClrMapping/>
+  </p:clrMapOvr>
+</p:sld>
+</file>
+
+<file path=ppt/slides/slide8.xml><?xml version="1.0" encoding="utf-8"?>
+<p:sld xmlns:a="http://schemas.openxmlformats.org/drawingml/2006/main" xmlns:r="http://schemas.openxmlformats.org/officeDocument/2006/relationships" xmlns:p="http://schemas.openxmlformats.org/presentationml/2006/main">
+  <p:cSld>
+    <p:spTree>
+      <p:nvGrpSpPr>
+        <p:cNvPr id="1" name=""/>
+        <p:cNvGrpSpPr/>
+        <p:nvPr/>
+      </p:nvGrpSpPr>
+      <p:grpSpPr>
+        <a:xfrm>
+          <a:off x="0" y="0"/>
+          <a:ext cx="0" cy="0"/>
+          <a:chOff x="0" y="0"/>
+          <a:chExt cx="0" cy="0"/>
+        </a:xfrm>
+      </p:grpSpPr>
+      <p:sp>
+        <p:nvSpPr>
+          <p:cNvPr id="2" name="Título 1">
+            <a:extLst>
+              <a:ext uri="{FF2B5EF4-FFF2-40B4-BE49-F238E27FC236}">
+                <a16:creationId xmlns:a16="http://schemas.microsoft.com/office/drawing/2014/main" id="{7D751ECC-10AA-4E1F-AFF5-118DB7EB4A2E}"/>
+              </a:ext>
+            </a:extLst>
+          </p:cNvPr>
+          <p:cNvSpPr>
+            <a:spLocks noGrp="1"/>
+          </p:cNvSpPr>
+          <p:nvPr>
+            <p:ph type="title"/>
+          </p:nvPr>
+        </p:nvSpPr>
+        <p:spPr/>
+        <p:txBody>
+          <a:bodyPr/>
+          <a:lstStyle/>
+          <a:p>
+            <a:r>
+              <a:rPr lang="es-MX" dirty="0"/>
+              <a:t>Bibliografía</a:t>
+            </a:r>
+          </a:p>
+        </p:txBody>
+      </p:sp>
+      <p:sp>
+        <p:nvSpPr>
+          <p:cNvPr id="3" name="Marcador de contenido 2">
+            <a:extLst>
+              <a:ext uri="{FF2B5EF4-FFF2-40B4-BE49-F238E27FC236}">
+                <a16:creationId xmlns:a16="http://schemas.microsoft.com/office/drawing/2014/main" id="{B1327A39-2827-450E-BB6E-36696A0FC4BC}"/>
+              </a:ext>
+            </a:extLst>
+          </p:cNvPr>
+          <p:cNvSpPr>
+            <a:spLocks noGrp="1"/>
+          </p:cNvSpPr>
+          <p:nvPr>
+            <p:ph idx="1"/>
+          </p:nvPr>
+        </p:nvSpPr>
+        <p:spPr/>
+        <p:txBody>
+          <a:bodyPr>
+            <a:normAutofit/>
+          </a:bodyPr>
+          <a:lstStyle/>
+          <a:p>
+            <a:r>
+              <a:rPr lang="en-US" sz="1400" i="1" dirty="0" err="1">
+                <a:latin typeface="+mj-lt"/>
+              </a:rPr>
+              <a:t>Fusto</a:t>
+            </a:r>
+            <a:r>
+              <a:rPr lang="en-US" sz="1400" i="1" dirty="0">
+                <a:latin typeface="+mj-lt"/>
+              </a:rPr>
+              <a:t>, G. (2020, October 2). Spider bites of medical significance in the Mediterranean area: misdiagnosis, clinical features and management. </a:t>
+            </a:r>
+            <a:r>
+              <a:rPr lang="en-US" sz="1400" i="1" dirty="0" err="1">
+                <a:latin typeface="+mj-lt"/>
+              </a:rPr>
+              <a:t>SciELO</a:t>
+            </a:r>
+            <a:r>
+              <a:rPr lang="en-US" sz="1400" i="1" dirty="0">
+                <a:latin typeface="+mj-lt"/>
+              </a:rPr>
+              <a:t> - Scientific Electronic Library Online. Retrieved October 20, 2021, from </a:t>
+            </a:r>
+            <a:r>
+              <a:rPr lang="en-US" sz="1400" i="1" dirty="0">
+                <a:latin typeface="+mj-lt"/>
+                <a:hlinkClick r:id="rId2"/>
+              </a:rPr>
+              <a:t>https://www.scielo.br/j/jvatitd/a/wQrfMGpmjygxpVBGSsFDgRp/?lang=en</a:t>
+            </a:r>
+            <a:endParaRPr lang="en-US" sz="1400" i="1" dirty="0">
+              <a:latin typeface="+mj-lt"/>
+            </a:endParaRPr>
+          </a:p>
+          <a:p>
+            <a:r>
+              <a:rPr lang="en-US" sz="1400" i="1" dirty="0">
+                <a:latin typeface="+mj-lt"/>
+              </a:rPr>
+              <a:t>Williams M, Anderson J, Nappe TM. Black Widow Spider Toxicity. [Updated 2021 Aug 11]. In: </a:t>
+            </a:r>
+            <a:r>
+              <a:rPr lang="en-US" sz="1400" i="1" dirty="0" err="1">
+                <a:latin typeface="+mj-lt"/>
+              </a:rPr>
+              <a:t>StatPearls</a:t>
+            </a:r>
+            <a:r>
+              <a:rPr lang="en-US" sz="1400" i="1" dirty="0">
+                <a:latin typeface="+mj-lt"/>
+              </a:rPr>
+              <a:t> [Internet]. Treasure Island (FL): </a:t>
+            </a:r>
+            <a:r>
+              <a:rPr lang="en-US" sz="1400" i="1" dirty="0" err="1">
+                <a:latin typeface="+mj-lt"/>
+              </a:rPr>
+              <a:t>StatPearls</a:t>
+            </a:r>
+            <a:r>
+              <a:rPr lang="en-US" sz="1400" i="1" dirty="0">
+                <a:latin typeface="+mj-lt"/>
+              </a:rPr>
+              <a:t> Publishing; 2021 Jan-. Available from: </a:t>
+            </a:r>
+            <a:r>
+              <a:rPr lang="en-US" sz="1400" i="1" dirty="0">
+                <a:latin typeface="+mj-lt"/>
+                <a:hlinkClick r:id="rId3"/>
+              </a:rPr>
+              <a:t>https://www.ncbi.nlm.nih.gov/books/NBK499987/</a:t>
+            </a:r>
+            <a:endParaRPr lang="en-US" sz="1400" i="1" dirty="0">
+              <a:latin typeface="+mj-lt"/>
+            </a:endParaRPr>
+          </a:p>
+          <a:p>
+            <a:r>
+              <a:rPr lang="en-US" sz="1400" i="1" dirty="0">
+                <a:latin typeface="+mj-lt"/>
+              </a:rPr>
+              <a:t>Sinnott, R. O., Yang, D., Ding, X., &amp; Ye, Z. (2020). Poisonous Spider Recognition through Deep Learning. Proceedings of the Australasian Computer Science Week Multiconference, 04(6), 1–6.</a:t>
+            </a:r>
+          </a:p>
+          <a:p>
+            <a:r>
+              <a:rPr lang="es-MX" sz="1400" b="0" i="1" dirty="0">
+                <a:solidFill>
+                  <a:srgbClr val="333333"/>
+                </a:solidFill>
+                <a:effectLst/>
+                <a:latin typeface="+mj-lt"/>
+              </a:rPr>
+              <a:t>Y. </a:t>
+            </a:r>
+            <a:r>
+              <a:rPr lang="es-MX" sz="1400" b="0" i="1" dirty="0" err="1">
+                <a:solidFill>
+                  <a:srgbClr val="333333"/>
+                </a:solidFill>
+                <a:effectLst/>
+                <a:latin typeface="+mj-lt"/>
+              </a:rPr>
+              <a:t>Jian</a:t>
+            </a:r>
+            <a:r>
+              <a:rPr lang="es-MX" sz="1400" b="0" i="1" dirty="0">
+                <a:solidFill>
+                  <a:srgbClr val="333333"/>
+                </a:solidFill>
+                <a:effectLst/>
+                <a:latin typeface="+mj-lt"/>
+              </a:rPr>
+              <a:t>, S. </a:t>
+            </a:r>
+            <a:r>
+              <a:rPr lang="es-MX" sz="1400" b="0" i="1" dirty="0" err="1">
+                <a:solidFill>
+                  <a:srgbClr val="333333"/>
+                </a:solidFill>
+                <a:effectLst/>
+                <a:latin typeface="+mj-lt"/>
+              </a:rPr>
+              <a:t>Peng</a:t>
+            </a:r>
+            <a:r>
+              <a:rPr lang="es-MX" sz="1400" b="0" i="1" dirty="0">
+                <a:solidFill>
+                  <a:srgbClr val="333333"/>
+                </a:solidFill>
+                <a:effectLst/>
+                <a:latin typeface="+mj-lt"/>
+              </a:rPr>
+              <a:t>, L. </a:t>
+            </a:r>
+            <a:r>
+              <a:rPr lang="es-MX" sz="1400" b="0" i="1" dirty="0" err="1">
+                <a:solidFill>
+                  <a:srgbClr val="333333"/>
+                </a:solidFill>
+                <a:effectLst/>
+                <a:latin typeface="+mj-lt"/>
+              </a:rPr>
+              <a:t>Zhenpeng</a:t>
+            </a:r>
+            <a:r>
+              <a:rPr lang="es-MX" sz="1400" b="0" i="1" dirty="0">
+                <a:solidFill>
+                  <a:srgbClr val="333333"/>
+                </a:solidFill>
+                <a:effectLst/>
+                <a:latin typeface="+mj-lt"/>
+              </a:rPr>
+              <a:t>, Z. </a:t>
+            </a:r>
+            <a:r>
+              <a:rPr lang="es-MX" sz="1400" b="0" i="1" dirty="0" err="1">
+                <a:solidFill>
+                  <a:srgbClr val="333333"/>
+                </a:solidFill>
+                <a:effectLst/>
+                <a:latin typeface="+mj-lt"/>
+              </a:rPr>
+              <a:t>Yu</a:t>
+            </a:r>
+            <a:r>
+              <a:rPr lang="es-MX" sz="1400" b="0" i="1" dirty="0">
+                <a:solidFill>
+                  <a:srgbClr val="333333"/>
+                </a:solidFill>
+                <a:effectLst/>
+                <a:latin typeface="+mj-lt"/>
+              </a:rPr>
+              <a:t>, Z. </a:t>
+            </a:r>
+            <a:r>
+              <a:rPr lang="es-MX" sz="1400" b="0" i="1" dirty="0" err="1">
+                <a:solidFill>
+                  <a:srgbClr val="333333"/>
+                </a:solidFill>
+                <a:effectLst/>
+                <a:latin typeface="+mj-lt"/>
+              </a:rPr>
+              <a:t>Chenggui</a:t>
+            </a:r>
+            <a:r>
+              <a:rPr lang="es-MX" sz="1400" b="0" i="1" dirty="0">
+                <a:solidFill>
+                  <a:srgbClr val="333333"/>
+                </a:solidFill>
+                <a:effectLst/>
+                <a:latin typeface="+mj-lt"/>
+              </a:rPr>
+              <a:t> and Y. </a:t>
+            </a:r>
+            <a:r>
+              <a:rPr lang="es-MX" sz="1400" b="0" i="1" dirty="0" err="1">
+                <a:solidFill>
+                  <a:srgbClr val="333333"/>
+                </a:solidFill>
+                <a:effectLst/>
+                <a:latin typeface="+mj-lt"/>
+              </a:rPr>
+              <a:t>Zizhong</a:t>
+            </a:r>
+            <a:r>
+              <a:rPr lang="es-MX" sz="1400" b="0" i="1" dirty="0">
+                <a:solidFill>
+                  <a:srgbClr val="333333"/>
+                </a:solidFill>
+                <a:effectLst/>
+                <a:latin typeface="+mj-lt"/>
+              </a:rPr>
+              <a:t>, "</a:t>
+            </a:r>
+            <a:r>
+              <a:rPr lang="es-MX" sz="1400" b="0" i="1" dirty="0" err="1">
+                <a:solidFill>
+                  <a:srgbClr val="333333"/>
+                </a:solidFill>
+                <a:effectLst/>
+                <a:latin typeface="+mj-lt"/>
+              </a:rPr>
+              <a:t>Automatic</a:t>
+            </a:r>
+            <a:r>
+              <a:rPr lang="es-MX" sz="1400" b="0" i="1" dirty="0">
+                <a:solidFill>
+                  <a:srgbClr val="333333"/>
+                </a:solidFill>
+                <a:effectLst/>
+                <a:latin typeface="+mj-lt"/>
+              </a:rPr>
+              <a:t> </a:t>
+            </a:r>
+            <a:r>
+              <a:rPr lang="es-MX" sz="1400" b="0" i="1" dirty="0" err="1">
+                <a:solidFill>
+                  <a:srgbClr val="333333"/>
+                </a:solidFill>
+                <a:effectLst/>
+                <a:latin typeface="+mj-lt"/>
+              </a:rPr>
+              <a:t>Classification</a:t>
+            </a:r>
+            <a:r>
+              <a:rPr lang="es-MX" sz="1400" b="0" i="1" dirty="0">
+                <a:solidFill>
+                  <a:srgbClr val="333333"/>
+                </a:solidFill>
+                <a:effectLst/>
+                <a:latin typeface="+mj-lt"/>
+              </a:rPr>
+              <a:t> </a:t>
+            </a:r>
+            <a:r>
+              <a:rPr lang="es-MX" sz="1400" b="0" i="1" dirty="0" err="1">
+                <a:solidFill>
+                  <a:srgbClr val="333333"/>
+                </a:solidFill>
+                <a:effectLst/>
+                <a:latin typeface="+mj-lt"/>
+              </a:rPr>
+              <a:t>of</a:t>
+            </a:r>
+            <a:r>
+              <a:rPr lang="es-MX" sz="1400" b="0" i="1" dirty="0">
+                <a:solidFill>
+                  <a:srgbClr val="333333"/>
+                </a:solidFill>
+                <a:effectLst/>
+                <a:latin typeface="+mj-lt"/>
+              </a:rPr>
+              <a:t> Spider </a:t>
+            </a:r>
+            <a:r>
+              <a:rPr lang="es-MX" sz="1400" b="0" i="1" dirty="0" err="1">
+                <a:solidFill>
+                  <a:srgbClr val="333333"/>
+                </a:solidFill>
+                <a:effectLst/>
+                <a:latin typeface="+mj-lt"/>
+              </a:rPr>
+              <a:t>Images</a:t>
+            </a:r>
+            <a:r>
+              <a:rPr lang="es-MX" sz="1400" b="0" i="1" dirty="0">
+                <a:solidFill>
+                  <a:srgbClr val="333333"/>
+                </a:solidFill>
+                <a:effectLst/>
+                <a:latin typeface="+mj-lt"/>
+              </a:rPr>
+              <a:t> in Natural </a:t>
+            </a:r>
+            <a:r>
+              <a:rPr lang="es-MX" sz="1400" b="0" i="1" dirty="0" err="1">
+                <a:solidFill>
+                  <a:srgbClr val="333333"/>
+                </a:solidFill>
+                <a:effectLst/>
+                <a:latin typeface="+mj-lt"/>
+              </a:rPr>
+              <a:t>Background</a:t>
+            </a:r>
+            <a:r>
+              <a:rPr lang="es-MX" sz="1400" b="0" i="1" dirty="0">
+                <a:solidFill>
+                  <a:srgbClr val="333333"/>
+                </a:solidFill>
+                <a:effectLst/>
+                <a:latin typeface="+mj-lt"/>
+              </a:rPr>
+              <a:t>," 2019 IEEE 4th International </a:t>
+            </a:r>
+            <a:r>
+              <a:rPr lang="es-MX" sz="1400" b="0" i="1" dirty="0" err="1">
+                <a:solidFill>
+                  <a:srgbClr val="333333"/>
+                </a:solidFill>
+                <a:effectLst/>
+                <a:latin typeface="+mj-lt"/>
+              </a:rPr>
+              <a:t>Conference</a:t>
+            </a:r>
+            <a:r>
+              <a:rPr lang="es-MX" sz="1400" b="0" i="1" dirty="0">
+                <a:solidFill>
+                  <a:srgbClr val="333333"/>
+                </a:solidFill>
+                <a:effectLst/>
+                <a:latin typeface="+mj-lt"/>
+              </a:rPr>
+              <a:t> </a:t>
+            </a:r>
+            <a:r>
+              <a:rPr lang="es-MX" sz="1400" b="0" i="1" dirty="0" err="1">
+                <a:solidFill>
+                  <a:srgbClr val="333333"/>
+                </a:solidFill>
+                <a:effectLst/>
+                <a:latin typeface="+mj-lt"/>
+              </a:rPr>
+              <a:t>on</a:t>
+            </a:r>
+            <a:r>
+              <a:rPr lang="es-MX" sz="1400" b="0" i="1" dirty="0">
+                <a:solidFill>
+                  <a:srgbClr val="333333"/>
+                </a:solidFill>
+                <a:effectLst/>
+                <a:latin typeface="+mj-lt"/>
+              </a:rPr>
+              <a:t> </a:t>
+            </a:r>
+            <a:r>
+              <a:rPr lang="es-MX" sz="1400" b="0" i="1" dirty="0" err="1">
+                <a:solidFill>
+                  <a:srgbClr val="333333"/>
+                </a:solidFill>
+                <a:effectLst/>
+                <a:latin typeface="+mj-lt"/>
+              </a:rPr>
+              <a:t>Signal</a:t>
+            </a:r>
+            <a:r>
+              <a:rPr lang="es-MX" sz="1400" b="0" i="1" dirty="0">
+                <a:solidFill>
+                  <a:srgbClr val="333333"/>
+                </a:solidFill>
+                <a:effectLst/>
+                <a:latin typeface="+mj-lt"/>
+              </a:rPr>
+              <a:t> and </a:t>
+            </a:r>
+            <a:r>
+              <a:rPr lang="es-MX" sz="1400" b="0" i="1" dirty="0" err="1">
+                <a:solidFill>
+                  <a:srgbClr val="333333"/>
+                </a:solidFill>
+                <a:effectLst/>
+                <a:latin typeface="+mj-lt"/>
+              </a:rPr>
+              <a:t>Image</a:t>
+            </a:r>
+            <a:r>
+              <a:rPr lang="es-MX" sz="1400" b="0" i="1" dirty="0">
+                <a:solidFill>
+                  <a:srgbClr val="333333"/>
+                </a:solidFill>
+                <a:effectLst/>
+                <a:latin typeface="+mj-lt"/>
+              </a:rPr>
+              <a:t> Processing (ICSIP), 2019, pp. 158-164, </a:t>
+            </a:r>
+            <a:r>
+              <a:rPr lang="es-MX" sz="1400" b="0" i="1" dirty="0" err="1">
+                <a:solidFill>
+                  <a:srgbClr val="333333"/>
+                </a:solidFill>
+                <a:effectLst/>
+                <a:latin typeface="+mj-lt"/>
+              </a:rPr>
+              <a:t>doi</a:t>
+            </a:r>
+            <a:r>
+              <a:rPr lang="es-MX" sz="1400" b="0" i="1" dirty="0">
+                <a:solidFill>
+                  <a:srgbClr val="333333"/>
+                </a:solidFill>
+                <a:effectLst/>
+                <a:latin typeface="+mj-lt"/>
+              </a:rPr>
+              <a:t>: 10.1109/SIPROCESS.2019.8868601.</a:t>
+            </a:r>
+          </a:p>
+          <a:p>
+            <a:r>
+              <a:rPr lang="en-US" sz="1400" i="1" dirty="0">
+                <a:latin typeface="+mj-lt"/>
+              </a:rPr>
+              <a:t>Sandler, Mark, Andrew Howard, </a:t>
+            </a:r>
+            <a:r>
+              <a:rPr lang="en-US" sz="1400" i="1" dirty="0" err="1">
+                <a:latin typeface="+mj-lt"/>
+              </a:rPr>
+              <a:t>Menglong</a:t>
+            </a:r>
+            <a:r>
+              <a:rPr lang="en-US" sz="1400" i="1" dirty="0">
+                <a:latin typeface="+mj-lt"/>
+              </a:rPr>
+              <a:t> Zhu, Andrey </a:t>
+            </a:r>
+            <a:r>
+              <a:rPr lang="en-US" sz="1400" i="1" dirty="0" err="1">
+                <a:latin typeface="+mj-lt"/>
+              </a:rPr>
+              <a:t>Zhmoginov</a:t>
+            </a:r>
+            <a:r>
+              <a:rPr lang="en-US" sz="1400" i="1" dirty="0">
+                <a:latin typeface="+mj-lt"/>
+              </a:rPr>
+              <a:t>, and Liang-</a:t>
+            </a:r>
+            <a:r>
+              <a:rPr lang="en-US" sz="1400" i="1" dirty="0" err="1">
+                <a:latin typeface="+mj-lt"/>
+              </a:rPr>
+              <a:t>Chieh</a:t>
+            </a:r>
+            <a:r>
+              <a:rPr lang="en-US" sz="1400" i="1" dirty="0">
+                <a:latin typeface="+mj-lt"/>
+              </a:rPr>
+              <a:t> Chen. “MobileNetV2: Inverted Residuals and Linear Bottlenecks.” arXiv.org, 2018. https://arxiv.org/abs/1801.04381.</a:t>
+            </a:r>
+          </a:p>
+        </p:txBody>
+      </p:sp>
+    </p:spTree>
+    <p:extLst>
+      <p:ext uri="{BB962C8B-B14F-4D97-AF65-F5344CB8AC3E}">
+        <p14:creationId xmlns:p14="http://schemas.microsoft.com/office/powerpoint/2010/main" val="3682137547"/>
       </p:ext>
     </p:extLst>
   </p:cSld>

</xml_diff>